<commit_message>
updated instruction slides: change obstacle to obstacles
</commit_message>
<xml_diff>
--- a/XPlanningEvaluation/data/instruction/collision-table-color-blind-friendly.pptx
+++ b/XPlanningEvaluation/data/instruction/collision-table-color-blind-friendly.pptx
@@ -3341,7 +3341,7 @@
           <p:nvPr>
             <p:extLst>
               <p:ext uri="{D42A27DB-BD31-4B8C-83A1-F6EECF244321}">
-                <p14:modId xmlns:p14="http://schemas.microsoft.com/office/powerpoint/2010/main" val="294016891"/>
+                <p14:modId xmlns:p14="http://schemas.microsoft.com/office/powerpoint/2010/main" val="1696191999"/>
               </p:ext>
             </p:extLst>
           </p:nvPr>
@@ -3441,7 +3441,7 @@
                     <a:lstStyle/>
                     <a:p>
                       <a:r>
-                        <a:rPr lang="en-US" sz="2400" b="1" dirty="0"/>
+                        <a:rPr lang="en-US" sz="2200" b="1" dirty="0"/>
                         <a:t>No Obstacle</a:t>
                       </a:r>
                     </a:p>
@@ -3481,8 +3481,8 @@
                     <a:lstStyle/>
                     <a:p>
                       <a:r>
-                        <a:rPr lang="en-US" sz="2400" b="1" dirty="0"/>
-                        <a:t>Sparse Obstacle</a:t>
+                        <a:rPr lang="en-US" sz="2200" b="1" dirty="0"/>
+                        <a:t>Sparse Obstacles</a:t>
                       </a:r>
                     </a:p>
                   </a:txBody>
@@ -3521,8 +3521,8 @@
                     <a:lstStyle/>
                     <a:p>
                       <a:r>
-                        <a:rPr lang="en-US" sz="2400" b="1" dirty="0"/>
-                        <a:t>Dense Obstacle</a:t>
+                        <a:rPr lang="en-US" sz="2200" b="1" dirty="0"/>
+                        <a:t>Dense Obstacles</a:t>
                       </a:r>
                     </a:p>
                   </a:txBody>

</xml_diff>

<commit_message>
updated obstacle notation in collision-table-color-blind-friendly.pptx
</commit_message>
<xml_diff>
--- a/XPlanningEvaluation/data/instruction/collision-table-color-blind-friendly.pptx
+++ b/XPlanningEvaluation/data/instruction/collision-table-color-blind-friendly.pptx
@@ -5,7 +5,7 @@
     <p:sldMasterId id="2147483648" r:id="rId1"/>
   </p:sldMasterIdLst>
   <p:sldIdLst>
-    <p:sldId id="259" r:id="rId2"/>
+    <p:sldId id="260" r:id="rId2"/>
   </p:sldIdLst>
   <p:sldSz cx="11777663" cy="5907088"/>
   <p:notesSz cx="6858000" cy="9144000"/>
@@ -259,7 +259,7 @@
           <a:p>
             <a:fld id="{C0533F6E-9159-954E-8711-191F1D6696D5}" type="datetimeFigureOut">
               <a:rPr lang="en-US" smtClean="0"/>
-              <a:t>9/9/19</a:t>
+              <a:t>9/13/19</a:t>
             </a:fld>
             <a:endParaRPr lang="en-US"/>
           </a:p>
@@ -457,7 +457,7 @@
           <a:p>
             <a:fld id="{C0533F6E-9159-954E-8711-191F1D6696D5}" type="datetimeFigureOut">
               <a:rPr lang="en-US" smtClean="0"/>
-              <a:t>9/9/19</a:t>
+              <a:t>9/13/19</a:t>
             </a:fld>
             <a:endParaRPr lang="en-US"/>
           </a:p>
@@ -665,7 +665,7 @@
           <a:p>
             <a:fld id="{C0533F6E-9159-954E-8711-191F1D6696D5}" type="datetimeFigureOut">
               <a:rPr lang="en-US" smtClean="0"/>
-              <a:t>9/9/19</a:t>
+              <a:t>9/13/19</a:t>
             </a:fld>
             <a:endParaRPr lang="en-US"/>
           </a:p>
@@ -863,7 +863,7 @@
           <a:p>
             <a:fld id="{C0533F6E-9159-954E-8711-191F1D6696D5}" type="datetimeFigureOut">
               <a:rPr lang="en-US" smtClean="0"/>
-              <a:t>9/9/19</a:t>
+              <a:t>9/13/19</a:t>
             </a:fld>
             <a:endParaRPr lang="en-US"/>
           </a:p>
@@ -1138,7 +1138,7 @@
           <a:p>
             <a:fld id="{C0533F6E-9159-954E-8711-191F1D6696D5}" type="datetimeFigureOut">
               <a:rPr lang="en-US" smtClean="0"/>
-              <a:t>9/9/19</a:t>
+              <a:t>9/13/19</a:t>
             </a:fld>
             <a:endParaRPr lang="en-US"/>
           </a:p>
@@ -1403,7 +1403,7 @@
           <a:p>
             <a:fld id="{C0533F6E-9159-954E-8711-191F1D6696D5}" type="datetimeFigureOut">
               <a:rPr lang="en-US" smtClean="0"/>
-              <a:t>9/9/19</a:t>
+              <a:t>9/13/19</a:t>
             </a:fld>
             <a:endParaRPr lang="en-US"/>
           </a:p>
@@ -1815,7 +1815,7 @@
           <a:p>
             <a:fld id="{C0533F6E-9159-954E-8711-191F1D6696D5}" type="datetimeFigureOut">
               <a:rPr lang="en-US" smtClean="0"/>
-              <a:t>9/9/19</a:t>
+              <a:t>9/13/19</a:t>
             </a:fld>
             <a:endParaRPr lang="en-US"/>
           </a:p>
@@ -1956,7 +1956,7 @@
           <a:p>
             <a:fld id="{C0533F6E-9159-954E-8711-191F1D6696D5}" type="datetimeFigureOut">
               <a:rPr lang="en-US" smtClean="0"/>
-              <a:t>9/9/19</a:t>
+              <a:t>9/13/19</a:t>
             </a:fld>
             <a:endParaRPr lang="en-US"/>
           </a:p>
@@ -2069,7 +2069,7 @@
           <a:p>
             <a:fld id="{C0533F6E-9159-954E-8711-191F1D6696D5}" type="datetimeFigureOut">
               <a:rPr lang="en-US" smtClean="0"/>
-              <a:t>9/9/19</a:t>
+              <a:t>9/13/19</a:t>
             </a:fld>
             <a:endParaRPr lang="en-US"/>
           </a:p>
@@ -2380,7 +2380,7 @@
           <a:p>
             <a:fld id="{C0533F6E-9159-954E-8711-191F1D6696D5}" type="datetimeFigureOut">
               <a:rPr lang="en-US" smtClean="0"/>
-              <a:t>9/9/19</a:t>
+              <a:t>9/13/19</a:t>
             </a:fld>
             <a:endParaRPr lang="en-US"/>
           </a:p>
@@ -2668,7 +2668,7 @@
           <a:p>
             <a:fld id="{C0533F6E-9159-954E-8711-191F1D6696D5}" type="datetimeFigureOut">
               <a:rPr lang="en-US" smtClean="0"/>
-              <a:t>9/9/19</a:t>
+              <a:t>9/13/19</a:t>
             </a:fld>
             <a:endParaRPr lang="en-US"/>
           </a:p>
@@ -2909,7 +2909,7 @@
           <a:p>
             <a:fld id="{C0533F6E-9159-954E-8711-191F1D6696D5}" type="datetimeFigureOut">
               <a:rPr lang="en-US" smtClean="0"/>
-              <a:t>9/9/19</a:t>
+              <a:t>9/13/19</a:t>
             </a:fld>
             <a:endParaRPr lang="en-US"/>
           </a:p>
@@ -3328,10 +3328,10 @@
       </p:grpSpPr>
       <p:graphicFrame>
         <p:nvGraphicFramePr>
-          <p:cNvPr id="2" name="Table 1">
-            <a:extLst>
-              <a:ext uri="{FF2B5EF4-FFF2-40B4-BE49-F238E27FC236}">
-                <a16:creationId xmlns:a16="http://schemas.microsoft.com/office/drawing/2014/main" id="{18E4C44D-A5AA-B646-BAED-16C80EA83CBF}"/>
+          <p:cNvPr id="61" name="Table 60">
+            <a:extLst>
+              <a:ext uri="{FF2B5EF4-FFF2-40B4-BE49-F238E27FC236}">
+                <a16:creationId xmlns:a16="http://schemas.microsoft.com/office/drawing/2014/main" id="{10B1F57D-A8B8-4549-B5B9-56493D4155A9}"/>
               </a:ext>
             </a:extLst>
           </p:cNvPr>
@@ -3341,13 +3341,13 @@
           <p:nvPr>
             <p:extLst>
               <p:ext uri="{D42A27DB-BD31-4B8C-83A1-F6EECF244321}">
-                <p14:modId xmlns:p14="http://schemas.microsoft.com/office/powerpoint/2010/main" val="1696191999"/>
+                <p14:modId xmlns:p14="http://schemas.microsoft.com/office/powerpoint/2010/main" val="4172317262"/>
               </p:ext>
             </p:extLst>
           </p:nvPr>
         </p:nvGraphicFramePr>
         <p:xfrm>
-          <a:off x="0" y="0"/>
+          <a:off x="0" y="-2882"/>
           <a:ext cx="11772900" cy="5909970"/>
         </p:xfrm>
         <a:graphic>
@@ -3560,10 +3560,10 @@
       </p:graphicFrame>
       <p:grpSp>
         <p:nvGrpSpPr>
-          <p:cNvPr id="3" name="Group 2">
-            <a:extLst>
-              <a:ext uri="{FF2B5EF4-FFF2-40B4-BE49-F238E27FC236}">
-                <a16:creationId xmlns:a16="http://schemas.microsoft.com/office/drawing/2014/main" id="{2272881E-456A-0A49-B5F1-15B90E8ADA38}"/>
+          <p:cNvPr id="62" name="Group 61">
+            <a:extLst>
+              <a:ext uri="{FF2B5EF4-FFF2-40B4-BE49-F238E27FC236}">
+                <a16:creationId xmlns:a16="http://schemas.microsoft.com/office/drawing/2014/main" id="{AA572CC1-0500-E14C-B4E9-C376DBC5CA84}"/>
               </a:ext>
             </a:extLst>
           </p:cNvPr>
@@ -3572,7 +3572,7 @@
         </p:nvGrpSpPr>
         <p:grpSpPr>
           <a:xfrm>
-            <a:off x="1512528" y="1346429"/>
+            <a:off x="1512528" y="1343547"/>
             <a:ext cx="4590895" cy="881285"/>
             <a:chOff x="1776374" y="1794409"/>
             <a:chExt cx="4590895" cy="881285"/>
@@ -3580,10 +3580,10 @@
         </p:grpSpPr>
         <p:grpSp>
           <p:nvGrpSpPr>
-            <p:cNvPr id="4" name="Group 3">
+            <p:cNvPr id="63" name="Group 62">
               <a:extLst>
                 <a:ext uri="{FF2B5EF4-FFF2-40B4-BE49-F238E27FC236}">
-                  <a16:creationId xmlns:a16="http://schemas.microsoft.com/office/drawing/2014/main" id="{C168BDB8-2CB6-B94D-A3AF-37B907A5D703}"/>
+                  <a16:creationId xmlns:a16="http://schemas.microsoft.com/office/drawing/2014/main" id="{DABDF8F2-5A8D-5F4F-B3F1-83401D434A9A}"/>
                 </a:ext>
               </a:extLst>
             </p:cNvPr>
@@ -3600,10 +3600,10 @@
           </p:grpSpPr>
           <p:pic>
             <p:nvPicPr>
-              <p:cNvPr id="6" name="Picture 5">
+              <p:cNvPr id="65" name="Picture 64">
                 <a:extLst>
                   <a:ext uri="{FF2B5EF4-FFF2-40B4-BE49-F238E27FC236}">
-                    <a16:creationId xmlns:a16="http://schemas.microsoft.com/office/drawing/2014/main" id="{D645DA44-D39D-5C47-8DC4-48582CB4977D}"/>
+                    <a16:creationId xmlns:a16="http://schemas.microsoft.com/office/drawing/2014/main" id="{3FEA23F3-40F4-9E42-84A3-97B3F7DC6658}"/>
                   </a:ext>
                 </a:extLst>
               </p:cNvPr>
@@ -3629,10 +3629,10 @@
           </p:pic>
           <p:sp>
             <p:nvSpPr>
-              <p:cNvPr id="7" name="Right Arrow 6">
+              <p:cNvPr id="66" name="Right Arrow 65">
                 <a:extLst>
                   <a:ext uri="{FF2B5EF4-FFF2-40B4-BE49-F238E27FC236}">
-                    <a16:creationId xmlns:a16="http://schemas.microsoft.com/office/drawing/2014/main" id="{4F335321-F1C8-8747-8DEA-CFF5F91739C0}"/>
+                    <a16:creationId xmlns:a16="http://schemas.microsoft.com/office/drawing/2014/main" id="{32CDC815-FA83-E24C-A352-AED75A99FBC1}"/>
                   </a:ext>
                 </a:extLst>
               </p:cNvPr>
@@ -3678,10 +3678,10 @@
           </p:sp>
           <p:sp>
             <p:nvSpPr>
-              <p:cNvPr id="8" name="TextBox 7">
+              <p:cNvPr id="67" name="TextBox 66">
                 <a:extLst>
                   <a:ext uri="{FF2B5EF4-FFF2-40B4-BE49-F238E27FC236}">
-                    <a16:creationId xmlns:a16="http://schemas.microsoft.com/office/drawing/2014/main" id="{CAED7FFE-165E-4F45-801E-0FCDE792465E}"/>
+                    <a16:creationId xmlns:a16="http://schemas.microsoft.com/office/drawing/2014/main" id="{9A02A8AA-FA4B-6946-AE05-FA256FE60C2B}"/>
                   </a:ext>
                 </a:extLst>
               </p:cNvPr>
@@ -3714,10 +3714,10 @@
         </p:grpSp>
         <p:sp>
           <p:nvSpPr>
-            <p:cNvPr id="5" name="TextBox 4">
+            <p:cNvPr id="64" name="TextBox 63">
               <a:extLst>
                 <a:ext uri="{FF2B5EF4-FFF2-40B4-BE49-F238E27FC236}">
-                  <a16:creationId xmlns:a16="http://schemas.microsoft.com/office/drawing/2014/main" id="{A78D9BB4-1DCC-7D41-A95C-BC11A492B626}"/>
+                  <a16:creationId xmlns:a16="http://schemas.microsoft.com/office/drawing/2014/main" id="{62F9612A-F9BF-BA44-A633-361D1259CDA2}"/>
                 </a:ext>
               </a:extLst>
             </p:cNvPr>
@@ -3764,10 +3764,10 @@
       </p:grpSp>
       <p:grpSp>
         <p:nvGrpSpPr>
-          <p:cNvPr id="9" name="Group 8">
-            <a:extLst>
-              <a:ext uri="{FF2B5EF4-FFF2-40B4-BE49-F238E27FC236}">
-                <a16:creationId xmlns:a16="http://schemas.microsoft.com/office/drawing/2014/main" id="{05349DCB-1FB9-9D4F-9935-22A0F4AD451B}"/>
+          <p:cNvPr id="68" name="Group 67">
+            <a:extLst>
+              <a:ext uri="{FF2B5EF4-FFF2-40B4-BE49-F238E27FC236}">
+                <a16:creationId xmlns:a16="http://schemas.microsoft.com/office/drawing/2014/main" id="{06D65CDA-C015-E346-86B9-D6DC65B609F2}"/>
               </a:ext>
             </a:extLst>
           </p:cNvPr>
@@ -3776,7 +3776,7 @@
         </p:nvGrpSpPr>
         <p:grpSpPr>
           <a:xfrm>
-            <a:off x="485248" y="3608497"/>
+            <a:off x="485248" y="3605615"/>
             <a:ext cx="365760" cy="295041"/>
             <a:chOff x="7803055" y="2574583"/>
             <a:chExt cx="365760" cy="295041"/>
@@ -3784,10 +3784,10 @@
         </p:grpSpPr>
         <p:sp>
           <p:nvSpPr>
-            <p:cNvPr id="10" name="Cube 9">
+            <p:cNvPr id="69" name="Cube 68">
               <a:extLst>
                 <a:ext uri="{FF2B5EF4-FFF2-40B4-BE49-F238E27FC236}">
-                  <a16:creationId xmlns:a16="http://schemas.microsoft.com/office/drawing/2014/main" id="{5954CAEA-398A-9548-A2BE-66B40043EE18}"/>
+                  <a16:creationId xmlns:a16="http://schemas.microsoft.com/office/drawing/2014/main" id="{E1A90222-AB5F-8544-91E0-A578BBCFAB4D}"/>
                 </a:ext>
               </a:extLst>
             </p:cNvPr>
@@ -3842,10 +3842,10 @@
         </p:sp>
         <p:sp>
           <p:nvSpPr>
-            <p:cNvPr id="11" name="Cube 10">
+            <p:cNvPr id="70" name="Cube 69">
               <a:extLst>
                 <a:ext uri="{FF2B5EF4-FFF2-40B4-BE49-F238E27FC236}">
-                  <a16:creationId xmlns:a16="http://schemas.microsoft.com/office/drawing/2014/main" id="{0651A30F-89EA-B941-A415-C25B8ECA8626}"/>
+                  <a16:creationId xmlns:a16="http://schemas.microsoft.com/office/drawing/2014/main" id="{0F5C9119-D72B-A545-83B4-7164EDCD67AD}"/>
                 </a:ext>
               </a:extLst>
             </p:cNvPr>
@@ -3900,10 +3900,10 @@
         </p:sp>
         <p:sp>
           <p:nvSpPr>
-            <p:cNvPr id="12" name="Cube 11">
+            <p:cNvPr id="71" name="Cube 70">
               <a:extLst>
                 <a:ext uri="{FF2B5EF4-FFF2-40B4-BE49-F238E27FC236}">
-                  <a16:creationId xmlns:a16="http://schemas.microsoft.com/office/drawing/2014/main" id="{FAC88A80-BC34-8149-B478-BC1DE47B2014}"/>
+                  <a16:creationId xmlns:a16="http://schemas.microsoft.com/office/drawing/2014/main" id="{C0C74113-4D82-0C43-ABFB-8F45B9B59758}"/>
                 </a:ext>
               </a:extLst>
             </p:cNvPr>
@@ -3958,10 +3958,10 @@
         </p:sp>
         <p:sp>
           <p:nvSpPr>
-            <p:cNvPr id="13" name="Cube 12">
+            <p:cNvPr id="72" name="Cube 71">
               <a:extLst>
                 <a:ext uri="{FF2B5EF4-FFF2-40B4-BE49-F238E27FC236}">
-                  <a16:creationId xmlns:a16="http://schemas.microsoft.com/office/drawing/2014/main" id="{6D3B765D-7948-834E-A475-5397AE029A50}"/>
+                  <a16:creationId xmlns:a16="http://schemas.microsoft.com/office/drawing/2014/main" id="{1D6F7B1B-65D7-0640-B4E2-7A92DB45A2A9}"/>
                 </a:ext>
               </a:extLst>
             </p:cNvPr>
@@ -4017,10 +4017,10 @@
       </p:grpSp>
       <p:pic>
         <p:nvPicPr>
-          <p:cNvPr id="14" name="Picture 13">
-            <a:extLst>
-              <a:ext uri="{FF2B5EF4-FFF2-40B4-BE49-F238E27FC236}">
-                <a16:creationId xmlns:a16="http://schemas.microsoft.com/office/drawing/2014/main" id="{F4F431B8-8897-7547-B099-EB685B1483BE}"/>
+          <p:cNvPr id="73" name="Picture 72">
+            <a:extLst>
+              <a:ext uri="{FF2B5EF4-FFF2-40B4-BE49-F238E27FC236}">
+                <a16:creationId xmlns:a16="http://schemas.microsoft.com/office/drawing/2014/main" id="{D06EAC47-D399-CC4F-9A8E-685B1AD6E253}"/>
               </a:ext>
             </a:extLst>
           </p:cNvPr>
@@ -4036,7 +4036,7 @@
         </p:blipFill>
         <p:spPr>
           <a:xfrm>
-            <a:off x="1512528" y="4636153"/>
+            <a:off x="1512528" y="4633271"/>
             <a:ext cx="431549" cy="640080"/>
           </a:xfrm>
           <a:prstGeom prst="rect">
@@ -4046,10 +4046,10 @@
       </p:pic>
       <p:sp>
         <p:nvSpPr>
-          <p:cNvPr id="15" name="Right Arrow 14">
-            <a:extLst>
-              <a:ext uri="{FF2B5EF4-FFF2-40B4-BE49-F238E27FC236}">
-                <a16:creationId xmlns:a16="http://schemas.microsoft.com/office/drawing/2014/main" id="{C7F47CD2-0C7B-BD44-ADE6-A6D74D7DC81A}"/>
+          <p:cNvPr id="74" name="Right Arrow 73">
+            <a:extLst>
+              <a:ext uri="{FF2B5EF4-FFF2-40B4-BE49-F238E27FC236}">
+                <a16:creationId xmlns:a16="http://schemas.microsoft.com/office/drawing/2014/main" id="{A90EEAE2-4A68-7942-8C8C-EA1359616A4E}"/>
               </a:ext>
             </a:extLst>
           </p:cNvPr>
@@ -4058,7 +4058,7 @@
         </p:nvSpPr>
         <p:spPr>
           <a:xfrm>
-            <a:off x="2126957" y="4956193"/>
+            <a:off x="2126957" y="4953311"/>
             <a:ext cx="1097280" cy="182880"/>
           </a:xfrm>
           <a:prstGeom prst="rightArrow">
@@ -4095,10 +4095,10 @@
       </p:sp>
       <p:grpSp>
         <p:nvGrpSpPr>
-          <p:cNvPr id="16" name="Group 15">
-            <a:extLst>
-              <a:ext uri="{FF2B5EF4-FFF2-40B4-BE49-F238E27FC236}">
-                <a16:creationId xmlns:a16="http://schemas.microsoft.com/office/drawing/2014/main" id="{6EF5F9BA-7FA5-0844-8180-4F1695B3F865}"/>
+          <p:cNvPr id="75" name="Group 74">
+            <a:extLst>
+              <a:ext uri="{FF2B5EF4-FFF2-40B4-BE49-F238E27FC236}">
+                <a16:creationId xmlns:a16="http://schemas.microsoft.com/office/drawing/2014/main" id="{B4089A28-DDA7-C541-AB04-A8765CFAD80F}"/>
               </a:ext>
             </a:extLst>
           </p:cNvPr>
@@ -4107,7 +4107,7 @@
         </p:nvGrpSpPr>
         <p:grpSpPr>
           <a:xfrm>
-            <a:off x="302368" y="5276233"/>
+            <a:off x="302368" y="5273351"/>
             <a:ext cx="731520" cy="295041"/>
             <a:chOff x="9699621" y="3380438"/>
             <a:chExt cx="731520" cy="295041"/>
@@ -4115,10 +4115,10 @@
         </p:grpSpPr>
         <p:sp>
           <p:nvSpPr>
-            <p:cNvPr id="17" name="Cube 16">
+            <p:cNvPr id="76" name="Cube 75">
               <a:extLst>
                 <a:ext uri="{FF2B5EF4-FFF2-40B4-BE49-F238E27FC236}">
-                  <a16:creationId xmlns:a16="http://schemas.microsoft.com/office/drawing/2014/main" id="{C99EC072-44CA-7F42-8D35-C30BD60D24C9}"/>
+                  <a16:creationId xmlns:a16="http://schemas.microsoft.com/office/drawing/2014/main" id="{AA24AB54-58A8-EC4C-BFD6-BA36F3EA5483}"/>
                 </a:ext>
               </a:extLst>
             </p:cNvPr>
@@ -4173,10 +4173,10 @@
         </p:sp>
         <p:sp>
           <p:nvSpPr>
-            <p:cNvPr id="18" name="Cube 17">
+            <p:cNvPr id="77" name="Cube 76">
               <a:extLst>
                 <a:ext uri="{FF2B5EF4-FFF2-40B4-BE49-F238E27FC236}">
-                  <a16:creationId xmlns:a16="http://schemas.microsoft.com/office/drawing/2014/main" id="{6C554B6D-47FB-A54B-A115-59AEBC0DF278}"/>
+                  <a16:creationId xmlns:a16="http://schemas.microsoft.com/office/drawing/2014/main" id="{FFA62F92-DBFA-D44D-B922-ABAC889628FC}"/>
                 </a:ext>
               </a:extLst>
             </p:cNvPr>
@@ -4231,10 +4231,10 @@
         </p:sp>
         <p:sp>
           <p:nvSpPr>
-            <p:cNvPr id="19" name="Cube 18">
+            <p:cNvPr id="78" name="Cube 77">
               <a:extLst>
                 <a:ext uri="{FF2B5EF4-FFF2-40B4-BE49-F238E27FC236}">
-                  <a16:creationId xmlns:a16="http://schemas.microsoft.com/office/drawing/2014/main" id="{93EC7CC0-12FB-8849-82B4-134A6D73681A}"/>
+                  <a16:creationId xmlns:a16="http://schemas.microsoft.com/office/drawing/2014/main" id="{F0FD7019-4855-0A49-9677-10C96E07F644}"/>
                 </a:ext>
               </a:extLst>
             </p:cNvPr>
@@ -4289,10 +4289,10 @@
         </p:sp>
         <p:sp>
           <p:nvSpPr>
-            <p:cNvPr id="20" name="Cube 19">
+            <p:cNvPr id="79" name="Cube 78">
               <a:extLst>
                 <a:ext uri="{FF2B5EF4-FFF2-40B4-BE49-F238E27FC236}">
-                  <a16:creationId xmlns:a16="http://schemas.microsoft.com/office/drawing/2014/main" id="{2BAAADE7-CEF5-5542-AEDA-9EC2D3A13982}"/>
+                  <a16:creationId xmlns:a16="http://schemas.microsoft.com/office/drawing/2014/main" id="{A7286E64-0E57-014C-8099-171B1D3B2507}"/>
                 </a:ext>
               </a:extLst>
             </p:cNvPr>
@@ -4347,10 +4347,10 @@
         </p:sp>
         <p:sp>
           <p:nvSpPr>
-            <p:cNvPr id="21" name="Cube 20">
+            <p:cNvPr id="80" name="Cube 79">
               <a:extLst>
                 <a:ext uri="{FF2B5EF4-FFF2-40B4-BE49-F238E27FC236}">
-                  <a16:creationId xmlns:a16="http://schemas.microsoft.com/office/drawing/2014/main" id="{3E7FC5F5-F052-1A4C-A795-0EFFD4D32F77}"/>
+                  <a16:creationId xmlns:a16="http://schemas.microsoft.com/office/drawing/2014/main" id="{E94A59F0-FBA3-654C-98D7-61FE87BB43DB}"/>
                 </a:ext>
               </a:extLst>
             </p:cNvPr>
@@ -4405,10 +4405,10 @@
         </p:sp>
         <p:sp>
           <p:nvSpPr>
-            <p:cNvPr id="22" name="Cube 21">
+            <p:cNvPr id="81" name="Cube 80">
               <a:extLst>
                 <a:ext uri="{FF2B5EF4-FFF2-40B4-BE49-F238E27FC236}">
-                  <a16:creationId xmlns:a16="http://schemas.microsoft.com/office/drawing/2014/main" id="{ACF0E8BA-710E-7A45-99C9-1F8B410FF5BB}"/>
+                  <a16:creationId xmlns:a16="http://schemas.microsoft.com/office/drawing/2014/main" id="{752E792C-6B6E-654B-9BEF-B904A08F8667}"/>
                 </a:ext>
               </a:extLst>
             </p:cNvPr>
@@ -4463,10 +4463,10 @@
         </p:sp>
         <p:sp>
           <p:nvSpPr>
-            <p:cNvPr id="23" name="Cube 22">
+            <p:cNvPr id="82" name="Cube 81">
               <a:extLst>
                 <a:ext uri="{FF2B5EF4-FFF2-40B4-BE49-F238E27FC236}">
-                  <a16:creationId xmlns:a16="http://schemas.microsoft.com/office/drawing/2014/main" id="{7C4C3307-45EC-9E4E-A0DD-36CEFD976B05}"/>
+                  <a16:creationId xmlns:a16="http://schemas.microsoft.com/office/drawing/2014/main" id="{5BD8A89C-B250-214E-8F03-42AEA5B4C01D}"/>
                 </a:ext>
               </a:extLst>
             </p:cNvPr>
@@ -4521,10 +4521,10 @@
         </p:sp>
         <p:sp>
           <p:nvSpPr>
-            <p:cNvPr id="24" name="Cube 23">
+            <p:cNvPr id="83" name="Cube 82">
               <a:extLst>
                 <a:ext uri="{FF2B5EF4-FFF2-40B4-BE49-F238E27FC236}">
-                  <a16:creationId xmlns:a16="http://schemas.microsoft.com/office/drawing/2014/main" id="{6D48699F-18E8-6341-952B-12B59A851A4E}"/>
+                  <a16:creationId xmlns:a16="http://schemas.microsoft.com/office/drawing/2014/main" id="{9980DE2E-4CA0-6E47-B0A8-F4551EF5B183}"/>
                 </a:ext>
               </a:extLst>
             </p:cNvPr>
@@ -4580,10 +4580,10 @@
       </p:grpSp>
       <p:sp>
         <p:nvSpPr>
-          <p:cNvPr id="25" name="TextBox 24">
-            <a:extLst>
-              <a:ext uri="{FF2B5EF4-FFF2-40B4-BE49-F238E27FC236}">
-                <a16:creationId xmlns:a16="http://schemas.microsoft.com/office/drawing/2014/main" id="{019272D5-D246-6248-A6E0-463CA8E9B310}"/>
+          <p:cNvPr id="84" name="TextBox 83">
+            <a:extLst>
+              <a:ext uri="{FF2B5EF4-FFF2-40B4-BE49-F238E27FC236}">
+                <a16:creationId xmlns:a16="http://schemas.microsoft.com/office/drawing/2014/main" id="{FE828B6C-BBF5-9B42-BCF8-11719611F5F2}"/>
               </a:ext>
             </a:extLst>
           </p:cNvPr>
@@ -4592,7 +4592,7 @@
         </p:nvSpPr>
         <p:spPr>
           <a:xfrm>
-            <a:off x="2231212" y="5139073"/>
+            <a:off x="2231212" y="5136191"/>
             <a:ext cx="888769" cy="369332"/>
           </a:xfrm>
           <a:prstGeom prst="rect">
@@ -4615,10 +4615,10 @@
       </p:sp>
       <p:sp>
         <p:nvSpPr>
-          <p:cNvPr id="26" name="TextBox 25">
-            <a:extLst>
-              <a:ext uri="{FF2B5EF4-FFF2-40B4-BE49-F238E27FC236}">
-                <a16:creationId xmlns:a16="http://schemas.microsoft.com/office/drawing/2014/main" id="{10B336CD-438C-F944-B2C1-7475E1B068F6}"/>
+          <p:cNvPr id="85" name="TextBox 84">
+            <a:extLst>
+              <a:ext uri="{FF2B5EF4-FFF2-40B4-BE49-F238E27FC236}">
+                <a16:creationId xmlns:a16="http://schemas.microsoft.com/office/drawing/2014/main" id="{7D8D9C20-0116-1245-BEC4-33762683E985}"/>
               </a:ext>
             </a:extLst>
           </p:cNvPr>
@@ -4627,7 +4627,7 @@
         </p:nvSpPr>
         <p:spPr>
           <a:xfrm>
-            <a:off x="3339475" y="4703500"/>
+            <a:off x="3339475" y="4700618"/>
             <a:ext cx="3174459" cy="707886"/>
           </a:xfrm>
           <a:prstGeom prst="rect">
@@ -4668,10 +4668,10 @@
       </p:sp>
       <p:grpSp>
         <p:nvGrpSpPr>
-          <p:cNvPr id="27" name="Group 26">
-            <a:extLst>
-              <a:ext uri="{FF2B5EF4-FFF2-40B4-BE49-F238E27FC236}">
-                <a16:creationId xmlns:a16="http://schemas.microsoft.com/office/drawing/2014/main" id="{CB04BA49-8D64-8B4D-A7F7-AEC3112FAF12}"/>
+          <p:cNvPr id="86" name="Group 85">
+            <a:extLst>
+              <a:ext uri="{FF2B5EF4-FFF2-40B4-BE49-F238E27FC236}">
+                <a16:creationId xmlns:a16="http://schemas.microsoft.com/office/drawing/2014/main" id="{7E7BD437-A8F2-BB4C-828C-C2513778B31E}"/>
               </a:ext>
             </a:extLst>
           </p:cNvPr>
@@ -4680,7 +4680,7 @@
         </p:nvGrpSpPr>
         <p:grpSpPr>
           <a:xfrm>
-            <a:off x="6815572" y="1346429"/>
+            <a:off x="6815572" y="1343547"/>
             <a:ext cx="4590895" cy="881285"/>
             <a:chOff x="7006072" y="1843674"/>
             <a:chExt cx="4590895" cy="881285"/>
@@ -4688,10 +4688,10 @@
         </p:grpSpPr>
         <p:grpSp>
           <p:nvGrpSpPr>
-            <p:cNvPr id="28" name="Group 27">
+            <p:cNvPr id="87" name="Group 86">
               <a:extLst>
                 <a:ext uri="{FF2B5EF4-FFF2-40B4-BE49-F238E27FC236}">
-                  <a16:creationId xmlns:a16="http://schemas.microsoft.com/office/drawing/2014/main" id="{4384DDE1-898B-F847-A4CB-113B8008D55D}"/>
+                  <a16:creationId xmlns:a16="http://schemas.microsoft.com/office/drawing/2014/main" id="{7FB79736-5ECC-7D4A-B638-69D4ED8CC091}"/>
                 </a:ext>
               </a:extLst>
             </p:cNvPr>
@@ -4708,10 +4708,10 @@
           </p:grpSpPr>
           <p:pic>
             <p:nvPicPr>
-              <p:cNvPr id="30" name="Picture 29">
+              <p:cNvPr id="89" name="Picture 88">
                 <a:extLst>
                   <a:ext uri="{FF2B5EF4-FFF2-40B4-BE49-F238E27FC236}">
-                    <a16:creationId xmlns:a16="http://schemas.microsoft.com/office/drawing/2014/main" id="{B0477C05-7814-5347-86BA-9E88531BF79D}"/>
+                    <a16:creationId xmlns:a16="http://schemas.microsoft.com/office/drawing/2014/main" id="{AB010C6E-E509-6344-9F4A-9D985F10D10A}"/>
                   </a:ext>
                 </a:extLst>
               </p:cNvPr>
@@ -4737,10 +4737,10 @@
           </p:pic>
           <p:sp>
             <p:nvSpPr>
-              <p:cNvPr id="31" name="Right Arrow 30">
+              <p:cNvPr id="90" name="Right Arrow 89">
                 <a:extLst>
                   <a:ext uri="{FF2B5EF4-FFF2-40B4-BE49-F238E27FC236}">
-                    <a16:creationId xmlns:a16="http://schemas.microsoft.com/office/drawing/2014/main" id="{06F36E57-EBD3-BA49-9D81-ABA94CB5F6BF}"/>
+                    <a16:creationId xmlns:a16="http://schemas.microsoft.com/office/drawing/2014/main" id="{7C174602-D64A-CF4B-BCB8-99311511A2ED}"/>
                   </a:ext>
                 </a:extLst>
               </p:cNvPr>
@@ -4786,10 +4786,10 @@
           </p:sp>
           <p:sp>
             <p:nvSpPr>
-              <p:cNvPr id="32" name="TextBox 31">
+              <p:cNvPr id="91" name="TextBox 90">
                 <a:extLst>
                   <a:ext uri="{FF2B5EF4-FFF2-40B4-BE49-F238E27FC236}">
-                    <a16:creationId xmlns:a16="http://schemas.microsoft.com/office/drawing/2014/main" id="{B0C25B45-9DBA-BB45-8033-08D6DE410296}"/>
+                    <a16:creationId xmlns:a16="http://schemas.microsoft.com/office/drawing/2014/main" id="{224C12B5-A62C-8144-B427-AAD9C731AFEE}"/>
                   </a:ext>
                 </a:extLst>
               </p:cNvPr>
@@ -4822,10 +4822,10 @@
         </p:grpSp>
         <p:sp>
           <p:nvSpPr>
-            <p:cNvPr id="29" name="TextBox 28">
+            <p:cNvPr id="88" name="TextBox 87">
               <a:extLst>
                 <a:ext uri="{FF2B5EF4-FFF2-40B4-BE49-F238E27FC236}">
-                  <a16:creationId xmlns:a16="http://schemas.microsoft.com/office/drawing/2014/main" id="{CD3AA1E6-6734-CD46-B53A-AC788B3F56CE}"/>
+                  <a16:creationId xmlns:a16="http://schemas.microsoft.com/office/drawing/2014/main" id="{5AB12934-6429-5844-9E87-D962A1D39A98}"/>
                 </a:ext>
               </a:extLst>
             </p:cNvPr>
@@ -4870,255 +4870,12 @@
           </p:txBody>
         </p:sp>
       </p:grpSp>
-      <p:grpSp>
-        <p:nvGrpSpPr>
-          <p:cNvPr id="33" name="Group 32">
-            <a:extLst>
-              <a:ext uri="{FF2B5EF4-FFF2-40B4-BE49-F238E27FC236}">
-                <a16:creationId xmlns:a16="http://schemas.microsoft.com/office/drawing/2014/main" id="{6890DAE8-DF4D-FE46-85F6-56B641556298}"/>
-              </a:ext>
-            </a:extLst>
-          </p:cNvPr>
-          <p:cNvGrpSpPr/>
-          <p:nvPr/>
-        </p:nvGrpSpPr>
-        <p:grpSpPr>
-          <a:xfrm>
-            <a:off x="1512528" y="2936924"/>
-            <a:ext cx="4985348" cy="949086"/>
-            <a:chOff x="1703028" y="3434169"/>
-            <a:chExt cx="4985348" cy="949086"/>
-          </a:xfrm>
-        </p:grpSpPr>
-        <p:sp>
-          <p:nvSpPr>
-            <p:cNvPr id="34" name="TextBox 33">
-              <a:extLst>
-                <a:ext uri="{FF2B5EF4-FFF2-40B4-BE49-F238E27FC236}">
-                  <a16:creationId xmlns:a16="http://schemas.microsoft.com/office/drawing/2014/main" id="{94034DCE-90E0-364E-947C-B508789675FF}"/>
-                </a:ext>
-              </a:extLst>
-            </p:cNvPr>
-            <p:cNvSpPr txBox="1"/>
-            <p:nvPr/>
-          </p:nvSpPr>
-          <p:spPr>
-            <a:xfrm>
-              <a:off x="3513917" y="3560400"/>
-              <a:ext cx="3174459" cy="707886"/>
-            </a:xfrm>
-            <a:prstGeom prst="rect">
-              <a:avLst/>
-            </a:prstGeom>
-            <a:noFill/>
-          </p:spPr>
-          <p:txBody>
-            <a:bodyPr wrap="none" rtlCol="0">
-              <a:spAutoFit/>
-            </a:bodyPr>
-            <a:lstStyle/>
-            <a:p>
-              <a:r>
-                <a:rPr lang="en-US" sz="2000" dirty="0"/>
-                <a:t>Probability of collision = </a:t>
-              </a:r>
-              <a:r>
-                <a:rPr lang="en-US" sz="2000" b="1" dirty="0"/>
-                <a:t>20%</a:t>
-              </a:r>
-            </a:p>
-            <a:p>
-              <a:r>
-                <a:rPr lang="en-US" sz="2000" dirty="0"/>
-                <a:t>(Expected collision = </a:t>
-              </a:r>
-              <a:r>
-                <a:rPr lang="en-US" sz="2000" b="1" dirty="0"/>
-                <a:t>0.2</a:t>
-              </a:r>
-              <a:r>
-                <a:rPr lang="en-US" sz="2000" dirty="0"/>
-                <a:t>)</a:t>
-              </a:r>
-            </a:p>
-          </p:txBody>
-        </p:sp>
-        <p:grpSp>
-          <p:nvGrpSpPr>
-            <p:cNvPr id="35" name="Group 34">
-              <a:extLst>
-                <a:ext uri="{FF2B5EF4-FFF2-40B4-BE49-F238E27FC236}">
-                  <a16:creationId xmlns:a16="http://schemas.microsoft.com/office/drawing/2014/main" id="{1F94E573-1549-654F-974E-7C9103D05938}"/>
-                </a:ext>
-              </a:extLst>
-            </p:cNvPr>
-            <p:cNvGrpSpPr/>
-            <p:nvPr/>
-          </p:nvGrpSpPr>
-          <p:grpSpPr>
-            <a:xfrm>
-              <a:off x="1703028" y="3434169"/>
-              <a:ext cx="1711709" cy="949086"/>
-              <a:chOff x="1703028" y="3434169"/>
-              <a:chExt cx="1711709" cy="949086"/>
-            </a:xfrm>
-          </p:grpSpPr>
-          <p:pic>
-            <p:nvPicPr>
-              <p:cNvPr id="36" name="Picture 35">
-                <a:extLst>
-                  <a:ext uri="{FF2B5EF4-FFF2-40B4-BE49-F238E27FC236}">
-                    <a16:creationId xmlns:a16="http://schemas.microsoft.com/office/drawing/2014/main" id="{A41D910A-55C1-DA44-8370-136C50D4CD51}"/>
-                  </a:ext>
-                </a:extLst>
-              </p:cNvPr>
-              <p:cNvPicPr>
-                <a:picLocks noChangeAspect="1"/>
-              </p:cNvPicPr>
-              <p:nvPr/>
-            </p:nvPicPr>
-            <p:blipFill rotWithShape="1">
-              <a:blip r:embed="rId2"/>
-              <a:srcRect l="26302" t="1905" r="24095"/>
-              <a:stretch/>
-            </p:blipFill>
-            <p:spPr>
-              <a:xfrm>
-                <a:off x="1703028" y="3501970"/>
-                <a:ext cx="431549" cy="640080"/>
-              </a:xfrm>
-              <a:prstGeom prst="rect">
-                <a:avLst/>
-              </a:prstGeom>
-            </p:spPr>
-          </p:pic>
-          <p:sp>
-            <p:nvSpPr>
-              <p:cNvPr id="37" name="Right Arrow 36">
-                <a:extLst>
-                  <a:ext uri="{FF2B5EF4-FFF2-40B4-BE49-F238E27FC236}">
-                    <a16:creationId xmlns:a16="http://schemas.microsoft.com/office/drawing/2014/main" id="{9FF93BEA-55A5-F142-BD3E-B00021DDBA8A}"/>
-                  </a:ext>
-                </a:extLst>
-              </p:cNvPr>
-              <p:cNvSpPr/>
-              <p:nvPr/>
-            </p:nvSpPr>
-            <p:spPr>
-              <a:xfrm>
-                <a:off x="2317457" y="3822010"/>
-                <a:ext cx="1097280" cy="182880"/>
-              </a:xfrm>
-              <a:prstGeom prst="rightArrow">
-                <a:avLst/>
-              </a:prstGeom>
-              <a:solidFill>
-                <a:srgbClr val="0000FF"/>
-              </a:solidFill>
-            </p:spPr>
-            <p:style>
-              <a:lnRef idx="2">
-                <a:schemeClr val="accent1">
-                  <a:shade val="50000"/>
-                </a:schemeClr>
-              </a:lnRef>
-              <a:fillRef idx="1">
-                <a:schemeClr val="accent1"/>
-              </a:fillRef>
-              <a:effectRef idx="0">
-                <a:schemeClr val="accent1"/>
-              </a:effectRef>
-              <a:fontRef idx="minor">
-                <a:schemeClr val="lt1"/>
-              </a:fontRef>
-            </p:style>
-            <p:txBody>
-              <a:bodyPr rtlCol="0" anchor="ctr"/>
-              <a:lstStyle/>
-              <a:p>
-                <a:pPr algn="ctr"/>
-                <a:endParaRPr lang="en-US"/>
-              </a:p>
-            </p:txBody>
-          </p:sp>
-          <p:sp>
-            <p:nvSpPr>
-              <p:cNvPr id="38" name="TextBox 37">
-                <a:extLst>
-                  <a:ext uri="{FF2B5EF4-FFF2-40B4-BE49-F238E27FC236}">
-                    <a16:creationId xmlns:a16="http://schemas.microsoft.com/office/drawing/2014/main" id="{465FA865-16B9-4345-9399-CFB81D61789E}"/>
-                  </a:ext>
-                </a:extLst>
-              </p:cNvPr>
-              <p:cNvSpPr txBox="1"/>
-              <p:nvPr/>
-            </p:nvSpPr>
-            <p:spPr>
-              <a:xfrm>
-                <a:off x="2421711" y="4013923"/>
-                <a:ext cx="888769" cy="369332"/>
-              </a:xfrm>
-              <a:prstGeom prst="rect">
-                <a:avLst/>
-              </a:prstGeom>
-              <a:noFill/>
-            </p:spPr>
-            <p:txBody>
-              <a:bodyPr wrap="none" rtlCol="0">
-                <a:spAutoFit/>
-              </a:bodyPr>
-              <a:lstStyle/>
-              <a:p>
-                <a:r>
-                  <a:rPr lang="en-US" dirty="0"/>
-                  <a:t>0.7 m/s</a:t>
-                </a:r>
-              </a:p>
-            </p:txBody>
-          </p:sp>
-          <p:sp>
-            <p:nvSpPr>
-              <p:cNvPr id="39" name="TextBox 38">
-                <a:extLst>
-                  <a:ext uri="{FF2B5EF4-FFF2-40B4-BE49-F238E27FC236}">
-                    <a16:creationId xmlns:a16="http://schemas.microsoft.com/office/drawing/2014/main" id="{62027389-06EB-5149-BFB7-811420B9E056}"/>
-                  </a:ext>
-                </a:extLst>
-              </p:cNvPr>
-              <p:cNvSpPr txBox="1"/>
-              <p:nvPr/>
-            </p:nvSpPr>
-            <p:spPr>
-              <a:xfrm>
-                <a:off x="2596477" y="3434169"/>
-                <a:ext cx="529312" cy="461665"/>
-              </a:xfrm>
-              <a:prstGeom prst="rect">
-                <a:avLst/>
-              </a:prstGeom>
-              <a:noFill/>
-            </p:spPr>
-            <p:txBody>
-              <a:bodyPr wrap="none" rtlCol="0">
-                <a:spAutoFit/>
-              </a:bodyPr>
-              <a:lstStyle/>
-              <a:p>
-                <a:r>
-                  <a:rPr lang="en-US" sz="2400" dirty="0"/>
-                  <a:t>SO</a:t>
-                </a:r>
-              </a:p>
-            </p:txBody>
-          </p:sp>
-        </p:grpSp>
-      </p:grpSp>
-      <p:sp>
-        <p:nvSpPr>
-          <p:cNvPr id="40" name="TextBox 39">
-            <a:extLst>
-              <a:ext uri="{FF2B5EF4-FFF2-40B4-BE49-F238E27FC236}">
-                <a16:creationId xmlns:a16="http://schemas.microsoft.com/office/drawing/2014/main" id="{63D56F98-9A3A-D241-8A82-B4C16B831B6A}"/>
+      <p:sp>
+        <p:nvSpPr>
+          <p:cNvPr id="92" name="TextBox 91">
+            <a:extLst>
+              <a:ext uri="{FF2B5EF4-FFF2-40B4-BE49-F238E27FC236}">
+                <a16:creationId xmlns:a16="http://schemas.microsoft.com/office/drawing/2014/main" id="{6EF8A8CD-D460-4E49-9FD2-3AEEB9CC1882}"/>
               </a:ext>
             </a:extLst>
           </p:cNvPr>
@@ -5127,8 +4884,8 @@
         </p:nvSpPr>
         <p:spPr>
           <a:xfrm>
-            <a:off x="2381932" y="4554628"/>
-            <a:ext cx="577402" cy="461665"/>
+            <a:off x="3323417" y="3060273"/>
+            <a:ext cx="3174459" cy="707886"/>
           </a:xfrm>
           <a:prstGeom prst="rect">
             <a:avLst/>
@@ -5142,18 +4899,473 @@
           <a:lstStyle/>
           <a:p>
             <a:r>
-              <a:rPr lang="en-US" sz="2400" dirty="0"/>
-              <a:t>DO</a:t>
+              <a:rPr lang="en-US" sz="2000" dirty="0"/>
+              <a:t>Probability of collision = </a:t>
+            </a:r>
+            <a:r>
+              <a:rPr lang="en-US" sz="2000" b="1" dirty="0"/>
+              <a:t>20%</a:t>
+            </a:r>
+          </a:p>
+          <a:p>
+            <a:r>
+              <a:rPr lang="en-US" sz="2000" dirty="0"/>
+              <a:t>(Expected collision = </a:t>
+            </a:r>
+            <a:r>
+              <a:rPr lang="en-US" sz="2000" b="1" dirty="0"/>
+              <a:t>0.2</a:t>
+            </a:r>
+            <a:r>
+              <a:rPr lang="en-US" sz="2000" dirty="0"/>
+              <a:t>)</a:t>
+            </a:r>
+          </a:p>
+        </p:txBody>
+      </p:sp>
+      <p:pic>
+        <p:nvPicPr>
+          <p:cNvPr id="93" name="Picture 92">
+            <a:extLst>
+              <a:ext uri="{FF2B5EF4-FFF2-40B4-BE49-F238E27FC236}">
+                <a16:creationId xmlns:a16="http://schemas.microsoft.com/office/drawing/2014/main" id="{02A53617-570B-B74B-A7EC-FA5DF9465BD4}"/>
+              </a:ext>
+            </a:extLst>
+          </p:cNvPr>
+          <p:cNvPicPr>
+            <a:picLocks noChangeAspect="1"/>
+          </p:cNvPicPr>
+          <p:nvPr/>
+        </p:nvPicPr>
+        <p:blipFill rotWithShape="1">
+          <a:blip r:embed="rId2"/>
+          <a:srcRect l="26302" t="1905" r="24095"/>
+          <a:stretch/>
+        </p:blipFill>
+        <p:spPr>
+          <a:xfrm>
+            <a:off x="1512528" y="3001843"/>
+            <a:ext cx="431549" cy="640080"/>
+          </a:xfrm>
+          <a:prstGeom prst="rect">
+            <a:avLst/>
+          </a:prstGeom>
+        </p:spPr>
+      </p:pic>
+      <p:sp>
+        <p:nvSpPr>
+          <p:cNvPr id="94" name="Right Arrow 93">
+            <a:extLst>
+              <a:ext uri="{FF2B5EF4-FFF2-40B4-BE49-F238E27FC236}">
+                <a16:creationId xmlns:a16="http://schemas.microsoft.com/office/drawing/2014/main" id="{A14D3E39-A5F3-324D-95BE-B2D4C6F2399D}"/>
+              </a:ext>
+            </a:extLst>
+          </p:cNvPr>
+          <p:cNvSpPr/>
+          <p:nvPr/>
+        </p:nvSpPr>
+        <p:spPr>
+          <a:xfrm>
+            <a:off x="2126957" y="3321883"/>
+            <a:ext cx="1097280" cy="182880"/>
+          </a:xfrm>
+          <a:prstGeom prst="rightArrow">
+            <a:avLst/>
+          </a:prstGeom>
+          <a:solidFill>
+            <a:srgbClr val="0000FF"/>
+          </a:solidFill>
+        </p:spPr>
+        <p:style>
+          <a:lnRef idx="2">
+            <a:schemeClr val="accent1">
+              <a:shade val="50000"/>
+            </a:schemeClr>
+          </a:lnRef>
+          <a:fillRef idx="1">
+            <a:schemeClr val="accent1"/>
+          </a:fillRef>
+          <a:effectRef idx="0">
+            <a:schemeClr val="accent1"/>
+          </a:effectRef>
+          <a:fontRef idx="minor">
+            <a:schemeClr val="lt1"/>
+          </a:fontRef>
+        </p:style>
+        <p:txBody>
+          <a:bodyPr rtlCol="0" anchor="ctr"/>
+          <a:lstStyle/>
+          <a:p>
+            <a:pPr algn="ctr"/>
+            <a:endParaRPr lang="en-US"/>
+          </a:p>
+        </p:txBody>
+      </p:sp>
+      <p:sp>
+        <p:nvSpPr>
+          <p:cNvPr id="95" name="TextBox 94">
+            <a:extLst>
+              <a:ext uri="{FF2B5EF4-FFF2-40B4-BE49-F238E27FC236}">
+                <a16:creationId xmlns:a16="http://schemas.microsoft.com/office/drawing/2014/main" id="{CA44611A-44C8-2B47-BD7F-4D43E878DECA}"/>
+              </a:ext>
+            </a:extLst>
+          </p:cNvPr>
+          <p:cNvSpPr txBox="1"/>
+          <p:nvPr/>
+        </p:nvSpPr>
+        <p:spPr>
+          <a:xfrm>
+            <a:off x="2231211" y="3513796"/>
+            <a:ext cx="888769" cy="369332"/>
+          </a:xfrm>
+          <a:prstGeom prst="rect">
+            <a:avLst/>
+          </a:prstGeom>
+          <a:noFill/>
+        </p:spPr>
+        <p:txBody>
+          <a:bodyPr wrap="none" rtlCol="0">
+            <a:spAutoFit/>
+          </a:bodyPr>
+          <a:lstStyle/>
+          <a:p>
+            <a:r>
+              <a:rPr lang="en-US" dirty="0"/>
+              <a:t>0.7 m/s</a:t>
+            </a:r>
+          </a:p>
+        </p:txBody>
+      </p:sp>
+      <p:sp>
+        <p:nvSpPr>
+          <p:cNvPr id="96" name="TextBox 95">
+            <a:extLst>
+              <a:ext uri="{FF2B5EF4-FFF2-40B4-BE49-F238E27FC236}">
+                <a16:creationId xmlns:a16="http://schemas.microsoft.com/office/drawing/2014/main" id="{780D01B1-8773-694D-9B2A-5F6FBB6F7E64}"/>
+              </a:ext>
+            </a:extLst>
+          </p:cNvPr>
+          <p:cNvSpPr txBox="1"/>
+          <p:nvPr/>
+        </p:nvSpPr>
+        <p:spPr>
+          <a:xfrm>
+            <a:off x="8632053" y="3045250"/>
+            <a:ext cx="2774414" cy="707886"/>
+          </a:xfrm>
+          <a:prstGeom prst="rect">
+            <a:avLst/>
+          </a:prstGeom>
+          <a:noFill/>
+        </p:spPr>
+        <p:txBody>
+          <a:bodyPr wrap="none" rtlCol="0">
+            <a:spAutoFit/>
+          </a:bodyPr>
+          <a:lstStyle/>
+          <a:p>
+            <a:r>
+              <a:rPr lang="en-US" sz="2000" dirty="0"/>
+              <a:t>No collision at low speed</a:t>
+            </a:r>
+          </a:p>
+          <a:p>
+            <a:r>
+              <a:rPr lang="en-US" sz="2000" dirty="0"/>
+              <a:t>(Expected collision = </a:t>
+            </a:r>
+            <a:r>
+              <a:rPr lang="en-US" sz="2000" b="1" dirty="0"/>
+              <a:t>0.0</a:t>
+            </a:r>
+            <a:r>
+              <a:rPr lang="en-US" sz="2000" dirty="0"/>
+              <a:t>)</a:t>
+            </a:r>
+          </a:p>
+        </p:txBody>
+      </p:sp>
+      <p:pic>
+        <p:nvPicPr>
+          <p:cNvPr id="97" name="Picture 96">
+            <a:extLst>
+              <a:ext uri="{FF2B5EF4-FFF2-40B4-BE49-F238E27FC236}">
+                <a16:creationId xmlns:a16="http://schemas.microsoft.com/office/drawing/2014/main" id="{A227C0EE-8811-8948-8EDF-076921EEA03E}"/>
+              </a:ext>
+            </a:extLst>
+          </p:cNvPr>
+          <p:cNvPicPr>
+            <a:picLocks noChangeAspect="1"/>
+          </p:cNvPicPr>
+          <p:nvPr/>
+        </p:nvPicPr>
+        <p:blipFill rotWithShape="1">
+          <a:blip r:embed="rId2"/>
+          <a:srcRect l="26302" t="1905" r="24095"/>
+          <a:stretch/>
+        </p:blipFill>
+        <p:spPr>
+          <a:xfrm>
+            <a:off x="6811404" y="2986820"/>
+            <a:ext cx="431549" cy="640080"/>
+          </a:xfrm>
+          <a:prstGeom prst="rect">
+            <a:avLst/>
+          </a:prstGeom>
+        </p:spPr>
+      </p:pic>
+      <p:sp>
+        <p:nvSpPr>
+          <p:cNvPr id="98" name="Right Arrow 97">
+            <a:extLst>
+              <a:ext uri="{FF2B5EF4-FFF2-40B4-BE49-F238E27FC236}">
+                <a16:creationId xmlns:a16="http://schemas.microsoft.com/office/drawing/2014/main" id="{412630E2-403B-DF43-BFE2-092168840AD5}"/>
+              </a:ext>
+            </a:extLst>
+          </p:cNvPr>
+          <p:cNvSpPr/>
+          <p:nvPr/>
+        </p:nvSpPr>
+        <p:spPr>
+          <a:xfrm>
+            <a:off x="7425833" y="3306860"/>
+            <a:ext cx="1097280" cy="182880"/>
+          </a:xfrm>
+          <a:prstGeom prst="rightArrow">
+            <a:avLst/>
+          </a:prstGeom>
+          <a:solidFill>
+            <a:srgbClr val="87CEEB"/>
+          </a:solidFill>
+        </p:spPr>
+        <p:style>
+          <a:lnRef idx="2">
+            <a:schemeClr val="accent1">
+              <a:shade val="50000"/>
+            </a:schemeClr>
+          </a:lnRef>
+          <a:fillRef idx="1">
+            <a:schemeClr val="accent1"/>
+          </a:fillRef>
+          <a:effectRef idx="0">
+            <a:schemeClr val="accent1"/>
+          </a:effectRef>
+          <a:fontRef idx="minor">
+            <a:schemeClr val="lt1"/>
+          </a:fontRef>
+        </p:style>
+        <p:txBody>
+          <a:bodyPr rtlCol="0" anchor="ctr"/>
+          <a:lstStyle/>
+          <a:p>
+            <a:pPr algn="ctr"/>
+            <a:endParaRPr lang="en-US"/>
+          </a:p>
+        </p:txBody>
+      </p:sp>
+      <p:sp>
+        <p:nvSpPr>
+          <p:cNvPr id="99" name="TextBox 98">
+            <a:extLst>
+              <a:ext uri="{FF2B5EF4-FFF2-40B4-BE49-F238E27FC236}">
+                <a16:creationId xmlns:a16="http://schemas.microsoft.com/office/drawing/2014/main" id="{DE16675E-93B0-1F4F-99C1-0D619911B7C6}"/>
+              </a:ext>
+            </a:extLst>
+          </p:cNvPr>
+          <p:cNvSpPr txBox="1"/>
+          <p:nvPr/>
+        </p:nvSpPr>
+        <p:spPr>
+          <a:xfrm>
+            <a:off x="7468713" y="3498773"/>
+            <a:ext cx="1005788" cy="369332"/>
+          </a:xfrm>
+          <a:prstGeom prst="rect">
+            <a:avLst/>
+          </a:prstGeom>
+          <a:noFill/>
+        </p:spPr>
+        <p:txBody>
+          <a:bodyPr wrap="none" rtlCol="0">
+            <a:spAutoFit/>
+          </a:bodyPr>
+          <a:lstStyle/>
+          <a:p>
+            <a:r>
+              <a:rPr lang="en-US" dirty="0"/>
+              <a:t>0.35 m/s</a:t>
+            </a:r>
+          </a:p>
+        </p:txBody>
+      </p:sp>
+      <p:sp>
+        <p:nvSpPr>
+          <p:cNvPr id="100" name="TextBox 99">
+            <a:extLst>
+              <a:ext uri="{FF2B5EF4-FFF2-40B4-BE49-F238E27FC236}">
+                <a16:creationId xmlns:a16="http://schemas.microsoft.com/office/drawing/2014/main" id="{16F18CBF-A9A1-F94A-A1DB-9934E28C537E}"/>
+              </a:ext>
+            </a:extLst>
+          </p:cNvPr>
+          <p:cNvSpPr txBox="1"/>
+          <p:nvPr/>
+        </p:nvSpPr>
+        <p:spPr>
+          <a:xfrm>
+            <a:off x="8632053" y="4706205"/>
+            <a:ext cx="2774414" cy="707886"/>
+          </a:xfrm>
+          <a:prstGeom prst="rect">
+            <a:avLst/>
+          </a:prstGeom>
+          <a:noFill/>
+        </p:spPr>
+        <p:txBody>
+          <a:bodyPr wrap="none" rtlCol="0">
+            <a:spAutoFit/>
+          </a:bodyPr>
+          <a:lstStyle/>
+          <a:p>
+            <a:r>
+              <a:rPr lang="en-US" sz="2000" dirty="0"/>
+              <a:t>No collision at low speed</a:t>
+            </a:r>
+          </a:p>
+          <a:p>
+            <a:r>
+              <a:rPr lang="en-US" sz="2000" dirty="0"/>
+              <a:t>(Expected collision = </a:t>
+            </a:r>
+            <a:r>
+              <a:rPr lang="en-US" sz="2000" b="1" dirty="0"/>
+              <a:t>0.0</a:t>
+            </a:r>
+            <a:r>
+              <a:rPr lang="en-US" sz="2000" dirty="0"/>
+              <a:t>)</a:t>
+            </a:r>
+          </a:p>
+        </p:txBody>
+      </p:sp>
+      <p:pic>
+        <p:nvPicPr>
+          <p:cNvPr id="101" name="Picture 100">
+            <a:extLst>
+              <a:ext uri="{FF2B5EF4-FFF2-40B4-BE49-F238E27FC236}">
+                <a16:creationId xmlns:a16="http://schemas.microsoft.com/office/drawing/2014/main" id="{5718AB52-DEFC-544C-A039-913B42B08927}"/>
+              </a:ext>
+            </a:extLst>
+          </p:cNvPr>
+          <p:cNvPicPr>
+            <a:picLocks noChangeAspect="1"/>
+          </p:cNvPicPr>
+          <p:nvPr/>
+        </p:nvPicPr>
+        <p:blipFill rotWithShape="1">
+          <a:blip r:embed="rId2"/>
+          <a:srcRect l="26302" t="1905" r="24095"/>
+          <a:stretch/>
+        </p:blipFill>
+        <p:spPr>
+          <a:xfrm>
+            <a:off x="6811404" y="4638858"/>
+            <a:ext cx="431549" cy="640080"/>
+          </a:xfrm>
+          <a:prstGeom prst="rect">
+            <a:avLst/>
+          </a:prstGeom>
+        </p:spPr>
+      </p:pic>
+      <p:sp>
+        <p:nvSpPr>
+          <p:cNvPr id="102" name="Right Arrow 101">
+            <a:extLst>
+              <a:ext uri="{FF2B5EF4-FFF2-40B4-BE49-F238E27FC236}">
+                <a16:creationId xmlns:a16="http://schemas.microsoft.com/office/drawing/2014/main" id="{E062597A-69B3-B345-B015-8B89EB4799CA}"/>
+              </a:ext>
+            </a:extLst>
+          </p:cNvPr>
+          <p:cNvSpPr/>
+          <p:nvPr/>
+        </p:nvSpPr>
+        <p:spPr>
+          <a:xfrm>
+            <a:off x="7425833" y="4958898"/>
+            <a:ext cx="1097280" cy="182880"/>
+          </a:xfrm>
+          <a:prstGeom prst="rightArrow">
+            <a:avLst/>
+          </a:prstGeom>
+          <a:solidFill>
+            <a:srgbClr val="87CEEB"/>
+          </a:solidFill>
+        </p:spPr>
+        <p:style>
+          <a:lnRef idx="2">
+            <a:schemeClr val="accent1">
+              <a:shade val="50000"/>
+            </a:schemeClr>
+          </a:lnRef>
+          <a:fillRef idx="1">
+            <a:schemeClr val="accent1"/>
+          </a:fillRef>
+          <a:effectRef idx="0">
+            <a:schemeClr val="accent1"/>
+          </a:effectRef>
+          <a:fontRef idx="minor">
+            <a:schemeClr val="lt1"/>
+          </a:fontRef>
+        </p:style>
+        <p:txBody>
+          <a:bodyPr rtlCol="0" anchor="ctr"/>
+          <a:lstStyle/>
+          <a:p>
+            <a:pPr algn="ctr"/>
+            <a:endParaRPr lang="en-US"/>
+          </a:p>
+        </p:txBody>
+      </p:sp>
+      <p:sp>
+        <p:nvSpPr>
+          <p:cNvPr id="103" name="TextBox 102">
+            <a:extLst>
+              <a:ext uri="{FF2B5EF4-FFF2-40B4-BE49-F238E27FC236}">
+                <a16:creationId xmlns:a16="http://schemas.microsoft.com/office/drawing/2014/main" id="{F65C17D0-37D4-F148-B903-5B10B0D0CBE6}"/>
+              </a:ext>
+            </a:extLst>
+          </p:cNvPr>
+          <p:cNvSpPr txBox="1"/>
+          <p:nvPr/>
+        </p:nvSpPr>
+        <p:spPr>
+          <a:xfrm>
+            <a:off x="7468713" y="5141778"/>
+            <a:ext cx="1005788" cy="369332"/>
+          </a:xfrm>
+          <a:prstGeom prst="rect">
+            <a:avLst/>
+          </a:prstGeom>
+          <a:noFill/>
+        </p:spPr>
+        <p:txBody>
+          <a:bodyPr wrap="none" rtlCol="0">
+            <a:spAutoFit/>
+          </a:bodyPr>
+          <a:lstStyle/>
+          <a:p>
+            <a:r>
+              <a:rPr lang="en-US" dirty="0"/>
+              <a:t>0.35 m/s</a:t>
             </a:r>
           </a:p>
         </p:txBody>
       </p:sp>
       <p:grpSp>
         <p:nvGrpSpPr>
-          <p:cNvPr id="41" name="Group 40">
-            <a:extLst>
-              <a:ext uri="{FF2B5EF4-FFF2-40B4-BE49-F238E27FC236}">
-                <a16:creationId xmlns:a16="http://schemas.microsoft.com/office/drawing/2014/main" id="{6E622BFA-6AF3-DE44-8D7A-F1835AF37A07}"/>
+          <p:cNvPr id="104" name="Group 103">
+            <a:extLst>
+              <a:ext uri="{FF2B5EF4-FFF2-40B4-BE49-F238E27FC236}">
+                <a16:creationId xmlns:a16="http://schemas.microsoft.com/office/drawing/2014/main" id="{A6CA9783-D96B-4C4A-AEB6-38B98F7A7FD2}"/>
               </a:ext>
             </a:extLst>
           </p:cNvPr>
@@ -5162,237 +5374,131 @@
         </p:nvGrpSpPr>
         <p:grpSpPr>
           <a:xfrm>
-            <a:off x="6811404" y="2901490"/>
-            <a:ext cx="4595063" cy="969497"/>
-            <a:chOff x="7001904" y="3398735"/>
-            <a:chExt cx="4595063" cy="969497"/>
+            <a:off x="2532445" y="3068759"/>
+            <a:ext cx="280585" cy="274320"/>
+            <a:chOff x="4313321" y="765015"/>
+            <a:chExt cx="280585" cy="274320"/>
           </a:xfrm>
         </p:grpSpPr>
         <p:sp>
           <p:nvSpPr>
-            <p:cNvPr id="42" name="TextBox 41">
+            <p:cNvPr id="105" name="Rectangle 104">
               <a:extLst>
                 <a:ext uri="{FF2B5EF4-FFF2-40B4-BE49-F238E27FC236}">
-                  <a16:creationId xmlns:a16="http://schemas.microsoft.com/office/drawing/2014/main" id="{D6D9DE7C-CFC5-EE42-9EC7-E38C387E23DB}"/>
+                  <a16:creationId xmlns:a16="http://schemas.microsoft.com/office/drawing/2014/main" id="{225961C6-1AB1-D846-AF9C-3364B8B6AABB}"/>
                 </a:ext>
               </a:extLst>
             </p:cNvPr>
-            <p:cNvSpPr txBox="1"/>
+            <p:cNvSpPr>
+              <a:spLocks noChangeAspect="1"/>
+            </p:cNvSpPr>
             <p:nvPr/>
           </p:nvSpPr>
           <p:spPr>
             <a:xfrm>
-              <a:off x="8822553" y="3545377"/>
-              <a:ext cx="2774414" cy="707886"/>
+              <a:off x="4313321" y="765015"/>
+              <a:ext cx="137160" cy="274320"/>
             </a:xfrm>
             <a:prstGeom prst="rect">
               <a:avLst/>
             </a:prstGeom>
-            <a:noFill/>
+            <a:solidFill>
+              <a:srgbClr val="CD950C"/>
+            </a:solidFill>
+            <a:ln w="19050">
+              <a:solidFill>
+                <a:schemeClr val="bg1"/>
+              </a:solidFill>
+            </a:ln>
           </p:spPr>
+          <p:style>
+            <a:lnRef idx="2">
+              <a:schemeClr val="accent1">
+                <a:shade val="50000"/>
+              </a:schemeClr>
+            </a:lnRef>
+            <a:fillRef idx="1">
+              <a:schemeClr val="accent1"/>
+            </a:fillRef>
+            <a:effectRef idx="0">
+              <a:schemeClr val="accent1"/>
+            </a:effectRef>
+            <a:fontRef idx="minor">
+              <a:schemeClr val="lt1"/>
+            </a:fontRef>
+          </p:style>
           <p:txBody>
-            <a:bodyPr wrap="none" rtlCol="0">
-              <a:spAutoFit/>
-            </a:bodyPr>
+            <a:bodyPr rtlCol="0" anchor="ctr"/>
             <a:lstStyle/>
             <a:p>
-              <a:r>
-                <a:rPr lang="en-US" sz="2000" dirty="0"/>
-                <a:t>No collision at low speed</a:t>
-              </a:r>
-            </a:p>
-            <a:p>
-              <a:r>
-                <a:rPr lang="en-US" sz="2000" dirty="0"/>
-                <a:t>(Expected collision = </a:t>
-              </a:r>
-              <a:r>
-                <a:rPr lang="en-US" sz="2000" b="1" dirty="0"/>
-                <a:t>0.0</a:t>
-              </a:r>
-              <a:r>
-                <a:rPr lang="en-US" sz="2000" dirty="0"/>
-                <a:t>)</a:t>
-              </a:r>
+              <a:pPr algn="ctr"/>
+              <a:endParaRPr lang="en-US"/>
             </a:p>
           </p:txBody>
         </p:sp>
-        <p:grpSp>
-          <p:nvGrpSpPr>
-            <p:cNvPr id="43" name="Group 42">
+        <p:sp>
+          <p:nvSpPr>
+            <p:cNvPr id="106" name="Rectangle 105">
               <a:extLst>
                 <a:ext uri="{FF2B5EF4-FFF2-40B4-BE49-F238E27FC236}">
-                  <a16:creationId xmlns:a16="http://schemas.microsoft.com/office/drawing/2014/main" id="{402924E1-E728-8B45-A54C-3AE9FBA588E4}"/>
+                  <a16:creationId xmlns:a16="http://schemas.microsoft.com/office/drawing/2014/main" id="{513A8239-2A92-F44D-BCF7-7FA072A1BD86}"/>
                 </a:ext>
               </a:extLst>
             </p:cNvPr>
-            <p:cNvGrpSpPr/>
+            <p:cNvSpPr>
+              <a:spLocks noChangeAspect="1"/>
+            </p:cNvSpPr>
             <p:nvPr/>
-          </p:nvGrpSpPr>
-          <p:grpSpPr>
+          </p:nvSpPr>
+          <p:spPr>
             <a:xfrm>
-              <a:off x="7001904" y="3398735"/>
-              <a:ext cx="1711709" cy="969497"/>
-              <a:chOff x="7001904" y="3398735"/>
-              <a:chExt cx="1711709" cy="969497"/>
+              <a:off x="4456746" y="765015"/>
+              <a:ext cx="137160" cy="274320"/>
             </a:xfrm>
-          </p:grpSpPr>
-          <p:pic>
-            <p:nvPicPr>
-              <p:cNvPr id="44" name="Picture 43">
-                <a:extLst>
-                  <a:ext uri="{FF2B5EF4-FFF2-40B4-BE49-F238E27FC236}">
-                    <a16:creationId xmlns:a16="http://schemas.microsoft.com/office/drawing/2014/main" id="{8F00D676-BED8-DF4C-A312-48C8D475DD7D}"/>
-                  </a:ext>
-                </a:extLst>
-              </p:cNvPr>
-              <p:cNvPicPr>
-                <a:picLocks noChangeAspect="1"/>
-              </p:cNvPicPr>
-              <p:nvPr/>
-            </p:nvPicPr>
-            <p:blipFill rotWithShape="1">
-              <a:blip r:embed="rId2"/>
-              <a:srcRect l="26302" t="1905" r="24095"/>
-              <a:stretch/>
-            </p:blipFill>
-            <p:spPr>
-              <a:xfrm>
-                <a:off x="7001904" y="3486947"/>
-                <a:ext cx="431549" cy="640080"/>
-              </a:xfrm>
-              <a:prstGeom prst="rect">
-                <a:avLst/>
-              </a:prstGeom>
-            </p:spPr>
-          </p:pic>
-          <p:sp>
-            <p:nvSpPr>
-              <p:cNvPr id="45" name="Right Arrow 44">
-                <a:extLst>
-                  <a:ext uri="{FF2B5EF4-FFF2-40B4-BE49-F238E27FC236}">
-                    <a16:creationId xmlns:a16="http://schemas.microsoft.com/office/drawing/2014/main" id="{99F28D61-3D08-1F4E-9185-4CC1EE214B31}"/>
-                  </a:ext>
-                </a:extLst>
-              </p:cNvPr>
-              <p:cNvSpPr/>
-              <p:nvPr/>
-            </p:nvSpPr>
-            <p:spPr>
-              <a:xfrm>
-                <a:off x="7616333" y="3806987"/>
-                <a:ext cx="1097280" cy="182880"/>
-              </a:xfrm>
-              <a:prstGeom prst="rightArrow">
-                <a:avLst/>
-              </a:prstGeom>
+            <a:prstGeom prst="rect">
+              <a:avLst/>
+            </a:prstGeom>
+            <a:solidFill>
+              <a:srgbClr val="8B6508"/>
+            </a:solidFill>
+            <a:ln w="19050">
               <a:solidFill>
-                <a:srgbClr val="87CEEB"/>
+                <a:schemeClr val="bg1"/>
               </a:solidFill>
-            </p:spPr>
-            <p:style>
-              <a:lnRef idx="2">
-                <a:schemeClr val="accent1">
-                  <a:shade val="50000"/>
-                </a:schemeClr>
-              </a:lnRef>
-              <a:fillRef idx="1">
-                <a:schemeClr val="accent1"/>
-              </a:fillRef>
-              <a:effectRef idx="0">
-                <a:schemeClr val="accent1"/>
-              </a:effectRef>
-              <a:fontRef idx="minor">
-                <a:schemeClr val="lt1"/>
-              </a:fontRef>
-            </p:style>
-            <p:txBody>
-              <a:bodyPr rtlCol="0" anchor="ctr"/>
-              <a:lstStyle/>
-              <a:p>
-                <a:pPr algn="ctr"/>
-                <a:endParaRPr lang="en-US"/>
-              </a:p>
-            </p:txBody>
-          </p:sp>
-          <p:sp>
-            <p:nvSpPr>
-              <p:cNvPr id="46" name="TextBox 45">
-                <a:extLst>
-                  <a:ext uri="{FF2B5EF4-FFF2-40B4-BE49-F238E27FC236}">
-                    <a16:creationId xmlns:a16="http://schemas.microsoft.com/office/drawing/2014/main" id="{36E3C0D7-CA58-F34E-BE2C-975C3D360BD6}"/>
-                  </a:ext>
-                </a:extLst>
-              </p:cNvPr>
-              <p:cNvSpPr txBox="1"/>
-              <p:nvPr/>
-            </p:nvSpPr>
-            <p:spPr>
-              <a:xfrm>
-                <a:off x="7659213" y="3998900"/>
-                <a:ext cx="1005788" cy="369332"/>
-              </a:xfrm>
-              <a:prstGeom prst="rect">
-                <a:avLst/>
-              </a:prstGeom>
-              <a:noFill/>
-            </p:spPr>
-            <p:txBody>
-              <a:bodyPr wrap="none" rtlCol="0">
-                <a:spAutoFit/>
-              </a:bodyPr>
-              <a:lstStyle/>
-              <a:p>
-                <a:r>
-                  <a:rPr lang="en-US" dirty="0"/>
-                  <a:t>0.35 m/s</a:t>
-                </a:r>
-              </a:p>
-            </p:txBody>
-          </p:sp>
-          <p:sp>
-            <p:nvSpPr>
-              <p:cNvPr id="47" name="TextBox 46">
-                <a:extLst>
-                  <a:ext uri="{FF2B5EF4-FFF2-40B4-BE49-F238E27FC236}">
-                    <a16:creationId xmlns:a16="http://schemas.microsoft.com/office/drawing/2014/main" id="{32960173-B692-D34A-911C-E8011E686E0B}"/>
-                  </a:ext>
-                </a:extLst>
-              </p:cNvPr>
-              <p:cNvSpPr txBox="1"/>
-              <p:nvPr/>
-            </p:nvSpPr>
-            <p:spPr>
-              <a:xfrm>
-                <a:off x="7897451" y="3398735"/>
-                <a:ext cx="529312" cy="461665"/>
-              </a:xfrm>
-              <a:prstGeom prst="rect">
-                <a:avLst/>
-              </a:prstGeom>
-              <a:noFill/>
-            </p:spPr>
-            <p:txBody>
-              <a:bodyPr wrap="none" rtlCol="0">
-                <a:spAutoFit/>
-              </a:bodyPr>
-              <a:lstStyle/>
-              <a:p>
-                <a:r>
-                  <a:rPr lang="en-US" sz="2400" dirty="0"/>
-                  <a:t>SO</a:t>
-                </a:r>
-              </a:p>
-            </p:txBody>
-          </p:sp>
-        </p:grpSp>
+            </a:ln>
+          </p:spPr>
+          <p:style>
+            <a:lnRef idx="2">
+              <a:schemeClr val="accent1">
+                <a:shade val="50000"/>
+              </a:schemeClr>
+            </a:lnRef>
+            <a:fillRef idx="1">
+              <a:schemeClr val="accent1"/>
+            </a:fillRef>
+            <a:effectRef idx="0">
+              <a:schemeClr val="accent1"/>
+            </a:effectRef>
+            <a:fontRef idx="minor">
+              <a:schemeClr val="lt1"/>
+            </a:fontRef>
+          </p:style>
+          <p:txBody>
+            <a:bodyPr rtlCol="0" anchor="ctr"/>
+            <a:lstStyle/>
+            <a:p>
+              <a:pPr algn="ctr"/>
+              <a:endParaRPr lang="en-US"/>
+            </a:p>
+          </p:txBody>
+        </p:sp>
       </p:grpSp>
       <p:grpSp>
         <p:nvGrpSpPr>
-          <p:cNvPr id="48" name="Group 47">
-            <a:extLst>
-              <a:ext uri="{FF2B5EF4-FFF2-40B4-BE49-F238E27FC236}">
-                <a16:creationId xmlns:a16="http://schemas.microsoft.com/office/drawing/2014/main" id="{2EAF1C8B-F9A4-2B41-B6FA-1BFDD027BAE4}"/>
+          <p:cNvPr id="107" name="Group 106">
+            <a:extLst>
+              <a:ext uri="{FF2B5EF4-FFF2-40B4-BE49-F238E27FC236}">
+                <a16:creationId xmlns:a16="http://schemas.microsoft.com/office/drawing/2014/main" id="{69F11348-03ED-D34B-A633-9DDD7434BD18}"/>
               </a:ext>
             </a:extLst>
           </p:cNvPr>
@@ -5401,235 +5507,619 @@
         </p:nvGrpSpPr>
         <p:grpSpPr>
           <a:xfrm>
-            <a:off x="6811404" y="4554627"/>
-            <a:ext cx="4595063" cy="959365"/>
-            <a:chOff x="7001904" y="5051872"/>
-            <a:chExt cx="4595063" cy="959365"/>
+            <a:off x="2384030" y="4700618"/>
+            <a:ext cx="558516" cy="274320"/>
+            <a:chOff x="2481749" y="5186915"/>
+            <a:chExt cx="558516" cy="274320"/>
           </a:xfrm>
         </p:grpSpPr>
         <p:sp>
           <p:nvSpPr>
-            <p:cNvPr id="49" name="TextBox 48">
+            <p:cNvPr id="108" name="Rectangle 107">
               <a:extLst>
                 <a:ext uri="{FF2B5EF4-FFF2-40B4-BE49-F238E27FC236}">
-                  <a16:creationId xmlns:a16="http://schemas.microsoft.com/office/drawing/2014/main" id="{04A0ACCB-53B0-CB4D-93BF-65357F1D4B7D}"/>
+                  <a16:creationId xmlns:a16="http://schemas.microsoft.com/office/drawing/2014/main" id="{F96C242E-E519-2541-9247-5678731D7D70}"/>
                 </a:ext>
               </a:extLst>
             </p:cNvPr>
-            <p:cNvSpPr txBox="1"/>
+            <p:cNvSpPr>
+              <a:spLocks noChangeAspect="1"/>
+            </p:cNvSpPr>
             <p:nvPr/>
           </p:nvSpPr>
           <p:spPr>
             <a:xfrm>
-              <a:off x="8822553" y="5206332"/>
-              <a:ext cx="2774414" cy="707886"/>
+              <a:off x="2481749" y="5186915"/>
+              <a:ext cx="137160" cy="274320"/>
             </a:xfrm>
             <a:prstGeom prst="rect">
               <a:avLst/>
             </a:prstGeom>
-            <a:noFill/>
+            <a:solidFill>
+              <a:srgbClr val="CD950C"/>
+            </a:solidFill>
+            <a:ln w="19050">
+              <a:solidFill>
+                <a:schemeClr val="bg1"/>
+              </a:solidFill>
+            </a:ln>
           </p:spPr>
+          <p:style>
+            <a:lnRef idx="2">
+              <a:schemeClr val="accent1">
+                <a:shade val="50000"/>
+              </a:schemeClr>
+            </a:lnRef>
+            <a:fillRef idx="1">
+              <a:schemeClr val="accent1"/>
+            </a:fillRef>
+            <a:effectRef idx="0">
+              <a:schemeClr val="accent1"/>
+            </a:effectRef>
+            <a:fontRef idx="minor">
+              <a:schemeClr val="lt1"/>
+            </a:fontRef>
+          </p:style>
           <p:txBody>
-            <a:bodyPr wrap="none" rtlCol="0">
-              <a:spAutoFit/>
-            </a:bodyPr>
+            <a:bodyPr rtlCol="0" anchor="ctr"/>
             <a:lstStyle/>
             <a:p>
-              <a:r>
-                <a:rPr lang="en-US" sz="2000" dirty="0"/>
-                <a:t>No collision at low speed</a:t>
-              </a:r>
-            </a:p>
-            <a:p>
-              <a:r>
-                <a:rPr lang="en-US" sz="2000" dirty="0"/>
-                <a:t>(Expected collision = </a:t>
-              </a:r>
-              <a:r>
-                <a:rPr lang="en-US" sz="2000" b="1" dirty="0"/>
-                <a:t>0.0</a:t>
-              </a:r>
-              <a:r>
-                <a:rPr lang="en-US" sz="2000" dirty="0"/>
-                <a:t>)</a:t>
-              </a:r>
+              <a:pPr algn="ctr"/>
+              <a:endParaRPr lang="en-US"/>
             </a:p>
           </p:txBody>
         </p:sp>
-        <p:grpSp>
-          <p:nvGrpSpPr>
-            <p:cNvPr id="50" name="Group 49">
+        <p:sp>
+          <p:nvSpPr>
+            <p:cNvPr id="109" name="Rectangle 108">
               <a:extLst>
                 <a:ext uri="{FF2B5EF4-FFF2-40B4-BE49-F238E27FC236}">
-                  <a16:creationId xmlns:a16="http://schemas.microsoft.com/office/drawing/2014/main" id="{0FABA93C-32F1-1D4F-BAFB-74DA0B2737DF}"/>
+                  <a16:creationId xmlns:a16="http://schemas.microsoft.com/office/drawing/2014/main" id="{B00994C6-A486-CA46-B030-7AABF725802C}"/>
                 </a:ext>
               </a:extLst>
             </p:cNvPr>
-            <p:cNvGrpSpPr/>
+            <p:cNvSpPr>
+              <a:spLocks noChangeAspect="1"/>
+            </p:cNvSpPr>
             <p:nvPr/>
-          </p:nvGrpSpPr>
-          <p:grpSpPr>
+          </p:nvSpPr>
+          <p:spPr>
             <a:xfrm>
-              <a:off x="7001904" y="5051872"/>
-              <a:ext cx="1711709" cy="959365"/>
-              <a:chOff x="7001904" y="5051872"/>
-              <a:chExt cx="1711709" cy="959365"/>
+              <a:off x="2620585" y="5186915"/>
+              <a:ext cx="137160" cy="274320"/>
             </a:xfrm>
-          </p:grpSpPr>
-          <p:pic>
-            <p:nvPicPr>
-              <p:cNvPr id="51" name="Picture 50">
-                <a:extLst>
-                  <a:ext uri="{FF2B5EF4-FFF2-40B4-BE49-F238E27FC236}">
-                    <a16:creationId xmlns:a16="http://schemas.microsoft.com/office/drawing/2014/main" id="{563CA9FB-BD8C-EC44-8B6F-8E216A12B6A3}"/>
-                  </a:ext>
-                </a:extLst>
-              </p:cNvPr>
-              <p:cNvPicPr>
-                <a:picLocks noChangeAspect="1"/>
-              </p:cNvPicPr>
-              <p:nvPr/>
-            </p:nvPicPr>
-            <p:blipFill rotWithShape="1">
-              <a:blip r:embed="rId2"/>
-              <a:srcRect l="26302" t="1905" r="24095"/>
-              <a:stretch/>
-            </p:blipFill>
-            <p:spPr>
-              <a:xfrm>
-                <a:off x="7001904" y="5138985"/>
-                <a:ext cx="431549" cy="640080"/>
-              </a:xfrm>
-              <a:prstGeom prst="rect">
-                <a:avLst/>
-              </a:prstGeom>
-            </p:spPr>
-          </p:pic>
-          <p:sp>
-            <p:nvSpPr>
-              <p:cNvPr id="52" name="Right Arrow 51">
-                <a:extLst>
-                  <a:ext uri="{FF2B5EF4-FFF2-40B4-BE49-F238E27FC236}">
-                    <a16:creationId xmlns:a16="http://schemas.microsoft.com/office/drawing/2014/main" id="{2BA14101-2BAC-1B4F-B728-53196ECD8EB1}"/>
-                  </a:ext>
-                </a:extLst>
-              </p:cNvPr>
-              <p:cNvSpPr/>
-              <p:nvPr/>
-            </p:nvSpPr>
-            <p:spPr>
-              <a:xfrm>
-                <a:off x="7616333" y="5459025"/>
-                <a:ext cx="1097280" cy="182880"/>
-              </a:xfrm>
-              <a:prstGeom prst="rightArrow">
-                <a:avLst/>
-              </a:prstGeom>
+            <a:prstGeom prst="rect">
+              <a:avLst/>
+            </a:prstGeom>
+            <a:solidFill>
+              <a:srgbClr val="8B6508"/>
+            </a:solidFill>
+            <a:ln w="19050">
               <a:solidFill>
-                <a:srgbClr val="87CEEB"/>
+                <a:schemeClr val="bg1"/>
               </a:solidFill>
-            </p:spPr>
-            <p:style>
-              <a:lnRef idx="2">
-                <a:schemeClr val="accent1">
-                  <a:shade val="50000"/>
-                </a:schemeClr>
-              </a:lnRef>
-              <a:fillRef idx="1">
-                <a:schemeClr val="accent1"/>
-              </a:fillRef>
-              <a:effectRef idx="0">
-                <a:schemeClr val="accent1"/>
-              </a:effectRef>
-              <a:fontRef idx="minor">
-                <a:schemeClr val="lt1"/>
-              </a:fontRef>
-            </p:style>
-            <p:txBody>
-              <a:bodyPr rtlCol="0" anchor="ctr"/>
-              <a:lstStyle/>
-              <a:p>
-                <a:pPr algn="ctr"/>
-                <a:endParaRPr lang="en-US"/>
-              </a:p>
-            </p:txBody>
-          </p:sp>
-          <p:sp>
-            <p:nvSpPr>
-              <p:cNvPr id="53" name="TextBox 52">
-                <a:extLst>
-                  <a:ext uri="{FF2B5EF4-FFF2-40B4-BE49-F238E27FC236}">
-                    <a16:creationId xmlns:a16="http://schemas.microsoft.com/office/drawing/2014/main" id="{2066E1A3-81D7-A245-80AF-281559AFE053}"/>
-                  </a:ext>
-                </a:extLst>
-              </p:cNvPr>
-              <p:cNvSpPr txBox="1"/>
-              <p:nvPr/>
-            </p:nvSpPr>
-            <p:spPr>
-              <a:xfrm>
-                <a:off x="7659213" y="5641905"/>
-                <a:ext cx="1005788" cy="369332"/>
-              </a:xfrm>
-              <a:prstGeom prst="rect">
-                <a:avLst/>
-              </a:prstGeom>
-              <a:noFill/>
-            </p:spPr>
-            <p:txBody>
-              <a:bodyPr wrap="none" rtlCol="0">
-                <a:spAutoFit/>
-              </a:bodyPr>
-              <a:lstStyle/>
-              <a:p>
-                <a:r>
-                  <a:rPr lang="en-US" dirty="0"/>
-                  <a:t>0.35 m/s</a:t>
-                </a:r>
-              </a:p>
-            </p:txBody>
-          </p:sp>
-          <p:sp>
-            <p:nvSpPr>
-              <p:cNvPr id="54" name="TextBox 53">
-                <a:extLst>
-                  <a:ext uri="{FF2B5EF4-FFF2-40B4-BE49-F238E27FC236}">
-                    <a16:creationId xmlns:a16="http://schemas.microsoft.com/office/drawing/2014/main" id="{8456DB7D-2FF3-C34B-8843-713AE2181BC2}"/>
-                  </a:ext>
-                </a:extLst>
-              </p:cNvPr>
-              <p:cNvSpPr txBox="1"/>
-              <p:nvPr/>
-            </p:nvSpPr>
-            <p:spPr>
-              <a:xfrm>
-                <a:off x="7873406" y="5051872"/>
-                <a:ext cx="577402" cy="461665"/>
-              </a:xfrm>
-              <a:prstGeom prst="rect">
-                <a:avLst/>
-              </a:prstGeom>
-              <a:noFill/>
-            </p:spPr>
-            <p:txBody>
-              <a:bodyPr wrap="none" rtlCol="0">
-                <a:spAutoFit/>
-              </a:bodyPr>
-              <a:lstStyle/>
-              <a:p>
-                <a:r>
-                  <a:rPr lang="en-US" sz="2400" dirty="0"/>
-                  <a:t>DO</a:t>
-                </a:r>
-              </a:p>
-            </p:txBody>
-          </p:sp>
-        </p:grpSp>
+            </a:ln>
+          </p:spPr>
+          <p:style>
+            <a:lnRef idx="2">
+              <a:schemeClr val="accent1">
+                <a:shade val="50000"/>
+              </a:schemeClr>
+            </a:lnRef>
+            <a:fillRef idx="1">
+              <a:schemeClr val="accent1"/>
+            </a:fillRef>
+            <a:effectRef idx="0">
+              <a:schemeClr val="accent1"/>
+            </a:effectRef>
+            <a:fontRef idx="minor">
+              <a:schemeClr val="lt1"/>
+            </a:fontRef>
+          </p:style>
+          <p:txBody>
+            <a:bodyPr rtlCol="0" anchor="ctr"/>
+            <a:lstStyle/>
+            <a:p>
+              <a:pPr algn="ctr"/>
+              <a:endParaRPr lang="en-US"/>
+            </a:p>
+          </p:txBody>
+        </p:sp>
+        <p:sp>
+          <p:nvSpPr>
+            <p:cNvPr id="110" name="Rectangle 109">
+              <a:extLst>
+                <a:ext uri="{FF2B5EF4-FFF2-40B4-BE49-F238E27FC236}">
+                  <a16:creationId xmlns:a16="http://schemas.microsoft.com/office/drawing/2014/main" id="{4BDA64C8-CB03-8E47-B21C-8F8CB9D15B13}"/>
+                </a:ext>
+              </a:extLst>
+            </p:cNvPr>
+            <p:cNvSpPr>
+              <a:spLocks noChangeAspect="1"/>
+            </p:cNvSpPr>
+            <p:nvPr/>
+          </p:nvSpPr>
+          <p:spPr>
+            <a:xfrm>
+              <a:off x="2762464" y="5186915"/>
+              <a:ext cx="137160" cy="274320"/>
+            </a:xfrm>
+            <a:prstGeom prst="rect">
+              <a:avLst/>
+            </a:prstGeom>
+            <a:solidFill>
+              <a:srgbClr val="CD950C"/>
+            </a:solidFill>
+            <a:ln w="19050">
+              <a:solidFill>
+                <a:schemeClr val="bg1"/>
+              </a:solidFill>
+            </a:ln>
+          </p:spPr>
+          <p:style>
+            <a:lnRef idx="2">
+              <a:schemeClr val="accent1">
+                <a:shade val="50000"/>
+              </a:schemeClr>
+            </a:lnRef>
+            <a:fillRef idx="1">
+              <a:schemeClr val="accent1"/>
+            </a:fillRef>
+            <a:effectRef idx="0">
+              <a:schemeClr val="accent1"/>
+            </a:effectRef>
+            <a:fontRef idx="minor">
+              <a:schemeClr val="lt1"/>
+            </a:fontRef>
+          </p:style>
+          <p:txBody>
+            <a:bodyPr rtlCol="0" anchor="ctr"/>
+            <a:lstStyle/>
+            <a:p>
+              <a:pPr algn="ctr"/>
+              <a:endParaRPr lang="en-US"/>
+            </a:p>
+          </p:txBody>
+        </p:sp>
+        <p:sp>
+          <p:nvSpPr>
+            <p:cNvPr id="111" name="Rectangle 110">
+              <a:extLst>
+                <a:ext uri="{FF2B5EF4-FFF2-40B4-BE49-F238E27FC236}">
+                  <a16:creationId xmlns:a16="http://schemas.microsoft.com/office/drawing/2014/main" id="{4BD99792-0515-264F-8B77-B24848C730AD}"/>
+                </a:ext>
+              </a:extLst>
+            </p:cNvPr>
+            <p:cNvSpPr>
+              <a:spLocks noChangeAspect="1"/>
+            </p:cNvSpPr>
+            <p:nvPr/>
+          </p:nvSpPr>
+          <p:spPr>
+            <a:xfrm>
+              <a:off x="2903105" y="5186915"/>
+              <a:ext cx="137160" cy="274320"/>
+            </a:xfrm>
+            <a:prstGeom prst="rect">
+              <a:avLst/>
+            </a:prstGeom>
+            <a:solidFill>
+              <a:srgbClr val="8B6508"/>
+            </a:solidFill>
+            <a:ln w="19050">
+              <a:solidFill>
+                <a:schemeClr val="bg1"/>
+              </a:solidFill>
+            </a:ln>
+          </p:spPr>
+          <p:style>
+            <a:lnRef idx="2">
+              <a:schemeClr val="accent1">
+                <a:shade val="50000"/>
+              </a:schemeClr>
+            </a:lnRef>
+            <a:fillRef idx="1">
+              <a:schemeClr val="accent1"/>
+            </a:fillRef>
+            <a:effectRef idx="0">
+              <a:schemeClr val="accent1"/>
+            </a:effectRef>
+            <a:fontRef idx="minor">
+              <a:schemeClr val="lt1"/>
+            </a:fontRef>
+          </p:style>
+          <p:txBody>
+            <a:bodyPr rtlCol="0" anchor="ctr"/>
+            <a:lstStyle/>
+            <a:p>
+              <a:pPr algn="ctr"/>
+              <a:endParaRPr lang="en-US"/>
+            </a:p>
+          </p:txBody>
+        </p:sp>
+      </p:grpSp>
+      <p:grpSp>
+        <p:nvGrpSpPr>
+          <p:cNvPr id="112" name="Group 111">
+            <a:extLst>
+              <a:ext uri="{FF2B5EF4-FFF2-40B4-BE49-F238E27FC236}">
+                <a16:creationId xmlns:a16="http://schemas.microsoft.com/office/drawing/2014/main" id="{E250F002-AA15-3545-A1C5-242747750E23}"/>
+              </a:ext>
+            </a:extLst>
+          </p:cNvPr>
+          <p:cNvGrpSpPr/>
+          <p:nvPr/>
+        </p:nvGrpSpPr>
+        <p:grpSpPr>
+          <a:xfrm>
+            <a:off x="7838348" y="3060273"/>
+            <a:ext cx="280585" cy="274320"/>
+            <a:chOff x="4313321" y="765015"/>
+            <a:chExt cx="280585" cy="274320"/>
+          </a:xfrm>
+        </p:grpSpPr>
+        <p:sp>
+          <p:nvSpPr>
+            <p:cNvPr id="113" name="Rectangle 112">
+              <a:extLst>
+                <a:ext uri="{FF2B5EF4-FFF2-40B4-BE49-F238E27FC236}">
+                  <a16:creationId xmlns:a16="http://schemas.microsoft.com/office/drawing/2014/main" id="{2063932C-864C-BD42-9105-14B96A4D2392}"/>
+                </a:ext>
+              </a:extLst>
+            </p:cNvPr>
+            <p:cNvSpPr>
+              <a:spLocks noChangeAspect="1"/>
+            </p:cNvSpPr>
+            <p:nvPr/>
+          </p:nvSpPr>
+          <p:spPr>
+            <a:xfrm>
+              <a:off x="4313321" y="765015"/>
+              <a:ext cx="137160" cy="274320"/>
+            </a:xfrm>
+            <a:prstGeom prst="rect">
+              <a:avLst/>
+            </a:prstGeom>
+            <a:solidFill>
+              <a:srgbClr val="CD950C"/>
+            </a:solidFill>
+            <a:ln w="19050">
+              <a:solidFill>
+                <a:schemeClr val="bg1"/>
+              </a:solidFill>
+            </a:ln>
+          </p:spPr>
+          <p:style>
+            <a:lnRef idx="2">
+              <a:schemeClr val="accent1">
+                <a:shade val="50000"/>
+              </a:schemeClr>
+            </a:lnRef>
+            <a:fillRef idx="1">
+              <a:schemeClr val="accent1"/>
+            </a:fillRef>
+            <a:effectRef idx="0">
+              <a:schemeClr val="accent1"/>
+            </a:effectRef>
+            <a:fontRef idx="minor">
+              <a:schemeClr val="lt1"/>
+            </a:fontRef>
+          </p:style>
+          <p:txBody>
+            <a:bodyPr rtlCol="0" anchor="ctr"/>
+            <a:lstStyle/>
+            <a:p>
+              <a:pPr algn="ctr"/>
+              <a:endParaRPr lang="en-US"/>
+            </a:p>
+          </p:txBody>
+        </p:sp>
+        <p:sp>
+          <p:nvSpPr>
+            <p:cNvPr id="114" name="Rectangle 113">
+              <a:extLst>
+                <a:ext uri="{FF2B5EF4-FFF2-40B4-BE49-F238E27FC236}">
+                  <a16:creationId xmlns:a16="http://schemas.microsoft.com/office/drawing/2014/main" id="{404F18F6-D854-4746-980A-DEF4469A56A9}"/>
+                </a:ext>
+              </a:extLst>
+            </p:cNvPr>
+            <p:cNvSpPr>
+              <a:spLocks noChangeAspect="1"/>
+            </p:cNvSpPr>
+            <p:nvPr/>
+          </p:nvSpPr>
+          <p:spPr>
+            <a:xfrm>
+              <a:off x="4456746" y="765015"/>
+              <a:ext cx="137160" cy="274320"/>
+            </a:xfrm>
+            <a:prstGeom prst="rect">
+              <a:avLst/>
+            </a:prstGeom>
+            <a:solidFill>
+              <a:srgbClr val="8B6508"/>
+            </a:solidFill>
+            <a:ln w="19050">
+              <a:solidFill>
+                <a:schemeClr val="bg1"/>
+              </a:solidFill>
+            </a:ln>
+          </p:spPr>
+          <p:style>
+            <a:lnRef idx="2">
+              <a:schemeClr val="accent1">
+                <a:shade val="50000"/>
+              </a:schemeClr>
+            </a:lnRef>
+            <a:fillRef idx="1">
+              <a:schemeClr val="accent1"/>
+            </a:fillRef>
+            <a:effectRef idx="0">
+              <a:schemeClr val="accent1"/>
+            </a:effectRef>
+            <a:fontRef idx="minor">
+              <a:schemeClr val="lt1"/>
+            </a:fontRef>
+          </p:style>
+          <p:txBody>
+            <a:bodyPr rtlCol="0" anchor="ctr"/>
+            <a:lstStyle/>
+            <a:p>
+              <a:pPr algn="ctr"/>
+              <a:endParaRPr lang="en-US"/>
+            </a:p>
+          </p:txBody>
+        </p:sp>
+      </p:grpSp>
+      <p:grpSp>
+        <p:nvGrpSpPr>
+          <p:cNvPr id="115" name="Group 114">
+            <a:extLst>
+              <a:ext uri="{FF2B5EF4-FFF2-40B4-BE49-F238E27FC236}">
+                <a16:creationId xmlns:a16="http://schemas.microsoft.com/office/drawing/2014/main" id="{E646CD91-8CF0-2642-9E2A-6982D08E02E5}"/>
+              </a:ext>
+            </a:extLst>
+          </p:cNvPr>
+          <p:cNvGrpSpPr/>
+          <p:nvPr/>
+        </p:nvGrpSpPr>
+        <p:grpSpPr>
+          <a:xfrm>
+            <a:off x="7692349" y="4700618"/>
+            <a:ext cx="558516" cy="274320"/>
+            <a:chOff x="2481749" y="5186915"/>
+            <a:chExt cx="558516" cy="274320"/>
+          </a:xfrm>
+        </p:grpSpPr>
+        <p:sp>
+          <p:nvSpPr>
+            <p:cNvPr id="116" name="Rectangle 115">
+              <a:extLst>
+                <a:ext uri="{FF2B5EF4-FFF2-40B4-BE49-F238E27FC236}">
+                  <a16:creationId xmlns:a16="http://schemas.microsoft.com/office/drawing/2014/main" id="{9F759A15-482D-BC47-B8EF-7D1C85F5B1ED}"/>
+                </a:ext>
+              </a:extLst>
+            </p:cNvPr>
+            <p:cNvSpPr>
+              <a:spLocks noChangeAspect="1"/>
+            </p:cNvSpPr>
+            <p:nvPr/>
+          </p:nvSpPr>
+          <p:spPr>
+            <a:xfrm>
+              <a:off x="2481749" y="5186915"/>
+              <a:ext cx="137160" cy="274320"/>
+            </a:xfrm>
+            <a:prstGeom prst="rect">
+              <a:avLst/>
+            </a:prstGeom>
+            <a:solidFill>
+              <a:srgbClr val="CD950C"/>
+            </a:solidFill>
+            <a:ln w="19050">
+              <a:solidFill>
+                <a:schemeClr val="bg1"/>
+              </a:solidFill>
+            </a:ln>
+          </p:spPr>
+          <p:style>
+            <a:lnRef idx="2">
+              <a:schemeClr val="accent1">
+                <a:shade val="50000"/>
+              </a:schemeClr>
+            </a:lnRef>
+            <a:fillRef idx="1">
+              <a:schemeClr val="accent1"/>
+            </a:fillRef>
+            <a:effectRef idx="0">
+              <a:schemeClr val="accent1"/>
+            </a:effectRef>
+            <a:fontRef idx="minor">
+              <a:schemeClr val="lt1"/>
+            </a:fontRef>
+          </p:style>
+          <p:txBody>
+            <a:bodyPr rtlCol="0" anchor="ctr"/>
+            <a:lstStyle/>
+            <a:p>
+              <a:pPr algn="ctr"/>
+              <a:endParaRPr lang="en-US"/>
+            </a:p>
+          </p:txBody>
+        </p:sp>
+        <p:sp>
+          <p:nvSpPr>
+            <p:cNvPr id="117" name="Rectangle 116">
+              <a:extLst>
+                <a:ext uri="{FF2B5EF4-FFF2-40B4-BE49-F238E27FC236}">
+                  <a16:creationId xmlns:a16="http://schemas.microsoft.com/office/drawing/2014/main" id="{3E9985F2-0E32-BA40-B137-C3FEBE2609AE}"/>
+                </a:ext>
+              </a:extLst>
+            </p:cNvPr>
+            <p:cNvSpPr>
+              <a:spLocks noChangeAspect="1"/>
+            </p:cNvSpPr>
+            <p:nvPr/>
+          </p:nvSpPr>
+          <p:spPr>
+            <a:xfrm>
+              <a:off x="2620585" y="5186915"/>
+              <a:ext cx="137160" cy="274320"/>
+            </a:xfrm>
+            <a:prstGeom prst="rect">
+              <a:avLst/>
+            </a:prstGeom>
+            <a:solidFill>
+              <a:srgbClr val="8B6508"/>
+            </a:solidFill>
+            <a:ln w="19050">
+              <a:solidFill>
+                <a:schemeClr val="bg1"/>
+              </a:solidFill>
+            </a:ln>
+          </p:spPr>
+          <p:style>
+            <a:lnRef idx="2">
+              <a:schemeClr val="accent1">
+                <a:shade val="50000"/>
+              </a:schemeClr>
+            </a:lnRef>
+            <a:fillRef idx="1">
+              <a:schemeClr val="accent1"/>
+            </a:fillRef>
+            <a:effectRef idx="0">
+              <a:schemeClr val="accent1"/>
+            </a:effectRef>
+            <a:fontRef idx="minor">
+              <a:schemeClr val="lt1"/>
+            </a:fontRef>
+          </p:style>
+          <p:txBody>
+            <a:bodyPr rtlCol="0" anchor="ctr"/>
+            <a:lstStyle/>
+            <a:p>
+              <a:pPr algn="ctr"/>
+              <a:endParaRPr lang="en-US"/>
+            </a:p>
+          </p:txBody>
+        </p:sp>
+        <p:sp>
+          <p:nvSpPr>
+            <p:cNvPr id="118" name="Rectangle 117">
+              <a:extLst>
+                <a:ext uri="{FF2B5EF4-FFF2-40B4-BE49-F238E27FC236}">
+                  <a16:creationId xmlns:a16="http://schemas.microsoft.com/office/drawing/2014/main" id="{9C3A3E8E-7E24-B544-8C22-0A653C50AF04}"/>
+                </a:ext>
+              </a:extLst>
+            </p:cNvPr>
+            <p:cNvSpPr>
+              <a:spLocks noChangeAspect="1"/>
+            </p:cNvSpPr>
+            <p:nvPr/>
+          </p:nvSpPr>
+          <p:spPr>
+            <a:xfrm>
+              <a:off x="2762464" y="5186915"/>
+              <a:ext cx="137160" cy="274320"/>
+            </a:xfrm>
+            <a:prstGeom prst="rect">
+              <a:avLst/>
+            </a:prstGeom>
+            <a:solidFill>
+              <a:srgbClr val="CD950C"/>
+            </a:solidFill>
+            <a:ln w="19050">
+              <a:solidFill>
+                <a:schemeClr val="bg1"/>
+              </a:solidFill>
+            </a:ln>
+          </p:spPr>
+          <p:style>
+            <a:lnRef idx="2">
+              <a:schemeClr val="accent1">
+                <a:shade val="50000"/>
+              </a:schemeClr>
+            </a:lnRef>
+            <a:fillRef idx="1">
+              <a:schemeClr val="accent1"/>
+            </a:fillRef>
+            <a:effectRef idx="0">
+              <a:schemeClr val="accent1"/>
+            </a:effectRef>
+            <a:fontRef idx="minor">
+              <a:schemeClr val="lt1"/>
+            </a:fontRef>
+          </p:style>
+          <p:txBody>
+            <a:bodyPr rtlCol="0" anchor="ctr"/>
+            <a:lstStyle/>
+            <a:p>
+              <a:pPr algn="ctr"/>
+              <a:endParaRPr lang="en-US"/>
+            </a:p>
+          </p:txBody>
+        </p:sp>
+        <p:sp>
+          <p:nvSpPr>
+            <p:cNvPr id="119" name="Rectangle 118">
+              <a:extLst>
+                <a:ext uri="{FF2B5EF4-FFF2-40B4-BE49-F238E27FC236}">
+                  <a16:creationId xmlns:a16="http://schemas.microsoft.com/office/drawing/2014/main" id="{E76BD79C-E7C9-7B42-9422-9DC31962AC8F}"/>
+                </a:ext>
+              </a:extLst>
+            </p:cNvPr>
+            <p:cNvSpPr>
+              <a:spLocks noChangeAspect="1"/>
+            </p:cNvSpPr>
+            <p:nvPr/>
+          </p:nvSpPr>
+          <p:spPr>
+            <a:xfrm>
+              <a:off x="2903105" y="5186915"/>
+              <a:ext cx="137160" cy="274320"/>
+            </a:xfrm>
+            <a:prstGeom prst="rect">
+              <a:avLst/>
+            </a:prstGeom>
+            <a:solidFill>
+              <a:srgbClr val="8B6508"/>
+            </a:solidFill>
+            <a:ln w="19050">
+              <a:solidFill>
+                <a:schemeClr val="bg1"/>
+              </a:solidFill>
+            </a:ln>
+          </p:spPr>
+          <p:style>
+            <a:lnRef idx="2">
+              <a:schemeClr val="accent1">
+                <a:shade val="50000"/>
+              </a:schemeClr>
+            </a:lnRef>
+            <a:fillRef idx="1">
+              <a:schemeClr val="accent1"/>
+            </a:fillRef>
+            <a:effectRef idx="0">
+              <a:schemeClr val="accent1"/>
+            </a:effectRef>
+            <a:fontRef idx="minor">
+              <a:schemeClr val="lt1"/>
+            </a:fontRef>
+          </p:style>
+          <p:txBody>
+            <a:bodyPr rtlCol="0" anchor="ctr"/>
+            <a:lstStyle/>
+            <a:p>
+              <a:pPr algn="ctr"/>
+              <a:endParaRPr lang="en-US"/>
+            </a:p>
+          </p:txBody>
+        </p:sp>
       </p:grpSp>
     </p:spTree>
     <p:extLst>
       <p:ext uri="{BB962C8B-B14F-4D97-AF65-F5344CB8AC3E}">
-        <p14:creationId xmlns:p14="http://schemas.microsoft.com/office/powerpoint/2010/main" val="2459490367"/>
+        <p14:creationId xmlns:p14="http://schemas.microsoft.com/office/powerpoint/2010/main" val="2816355026"/>
       </p:ext>
     </p:extLst>
   </p:cSld>

</xml_diff>